<commit_message>
Powerpoint - add slides
Implementation Power schematic, modules schematic, PCB,
Verification slide
</commit_message>
<xml_diff>
--- a/Project Details/IR Presentation 3.pptx
+++ b/Project Details/IR Presentation 3.pptx
@@ -16,12 +16,15 @@
     <p:sldId id="264" r:id="rId10"/>
     <p:sldId id="263" r:id="rId11"/>
     <p:sldId id="267" r:id="rId12"/>
-    <p:sldId id="275" r:id="rId13"/>
-    <p:sldId id="270" r:id="rId14"/>
-    <p:sldId id="271" r:id="rId15"/>
-    <p:sldId id="272" r:id="rId16"/>
-    <p:sldId id="273" r:id="rId17"/>
-    <p:sldId id="274" r:id="rId18"/>
+    <p:sldId id="278" r:id="rId13"/>
+    <p:sldId id="277" r:id="rId14"/>
+    <p:sldId id="276" r:id="rId15"/>
+    <p:sldId id="275" r:id="rId16"/>
+    <p:sldId id="270" r:id="rId17"/>
+    <p:sldId id="271" r:id="rId18"/>
+    <p:sldId id="272" r:id="rId19"/>
+    <p:sldId id="273" r:id="rId20"/>
+    <p:sldId id="274" r:id="rId21"/>
   </p:sldIdLst>
   <p:sldSz cx="12192000" cy="6858000"/>
   <p:notesSz cx="6858000" cy="9144000"/>
@@ -122,7 +125,7 @@
   </p:defaultTextStyle>
   <p:extLst>
     <p:ext uri="{EFAFB233-063F-42B5-8137-9DF3F51BA10A}">
-      <p15:sldGuideLst xmlns:p15="http://schemas.microsoft.com/office/powerpoint/2012/main" xmlns="">
+      <p15:sldGuideLst xmlns="" xmlns:p15="http://schemas.microsoft.com/office/powerpoint/2012/main">
         <p15:guide id="1" orient="horz" pos="2160">
           <p15:clr>
             <a:srgbClr val="A4A3A4"/>
@@ -12888,18 +12891,7 @@
                   </a:schemeClr>
                 </a:solidFill>
               </a:rPr>
-              <a:t>Four </a:t>
-            </a:r>
-            <a:r>
-              <a:rPr lang="en-US" sz="3000" dirty="0" smtClean="0">
-                <a:solidFill>
-                  <a:schemeClr val="tx2">
-                    <a:lumMod val="40000"/>
-                    <a:lumOff val="60000"/>
-                  </a:schemeClr>
-                </a:solidFill>
-              </a:rPr>
-              <a:t>LED</a:t>
+              <a:t>Four LED</a:t>
             </a:r>
           </a:p>
           <a:p>
@@ -13388,8 +13380,8 @@
         </p:nvSpPr>
         <p:spPr/>
       </p:sp>
-      <mc:AlternateContent xmlns:mc="http://schemas.openxmlformats.org/markup-compatibility/2006">
-        <mc:Choice xmlns:a14="http://schemas.microsoft.com/office/drawing/2010/main" Requires="a14">
+      <mc:AlternateContent xmlns:mc="http://schemas.openxmlformats.org/markup-compatibility/2006" xmlns:a14="http://schemas.microsoft.com/office/drawing/2010/main">
+        <mc:Choice Requires="a14">
           <p:sp>
             <p:nvSpPr>
               <p:cNvPr id="4" name="Text Placeholder 3"/>
@@ -13459,14 +13451,6 @@
                   </a:rPr>
                   <a:t>epresent Each Unit</a:t>
                 </a:r>
-                <a:endParaRPr lang="en-US" sz="2400" dirty="0" smtClean="0">
-                  <a:solidFill>
-                    <a:schemeClr val="tx2">
-                      <a:lumMod val="40000"/>
-                      <a:lumOff val="60000"/>
-                    </a:schemeClr>
-                  </a:solidFill>
-                </a:endParaRPr>
               </a:p>
               <a:p>
                 <a:pPr marL="742950" lvl="1" indent="-285750">
@@ -13603,7 +13587,7 @@
             </p:txBody>
           </p:sp>
         </mc:Choice>
-        <mc:Fallback>
+        <mc:Fallback xmlns="">
           <p:sp>
             <p:nvSpPr>
               <p:cNvPr id="4" name="Text Placeholder 3"/>
@@ -13675,7 +13659,7 @@
               <a:buNone/>
             </a:pPr>
             <a:r>
-              <a:rPr lang="en-US" sz="3600" kern="10" spc="0" smtClean="0">
+              <a:rPr lang="en-US" sz="3600" kern="10" spc="0" dirty="0" err="1" smtClean="0">
                 <a:ln w="9525">
                   <a:solidFill>
                     <a:srgbClr val="000000"/>
@@ -13692,7 +13676,7 @@
               </a:rPr>
               <a:t>SignalSenders</a:t>
             </a:r>
-            <a:endParaRPr lang="en-US" sz="3600" kern="10" spc="0">
+            <a:endParaRPr lang="en-US" sz="3600" kern="10" spc="0" dirty="0">
               <a:ln w="9525">
                 <a:solidFill>
                   <a:srgbClr val="000000"/>
@@ -13749,6 +13733,206 @@
       </p:grpSpPr>
       <p:sp>
         <p:nvSpPr>
+          <p:cNvPr id="5" name="Title 1"/>
+          <p:cNvSpPr txBox="1">
+            <a:spLocks/>
+          </p:cNvSpPr>
+          <p:nvPr/>
+        </p:nvSpPr>
+        <p:spPr>
+          <a:xfrm>
+            <a:off x="678789" y="-142875"/>
+            <a:ext cx="5934508" cy="1639886"/>
+          </a:xfrm>
+          <a:prstGeom prst="rect">
+            <a:avLst/>
+          </a:prstGeom>
+        </p:spPr>
+        <p:txBody>
+          <a:bodyPr vert="horz" lIns="91440" tIns="45720" rIns="91440" bIns="45720" rtlCol="0" anchor="b">
+            <a:normAutofit/>
+          </a:bodyPr>
+          <a:lstStyle>
+            <a:lvl1pPr algn="l" defTabSz="914400" rtl="0" eaLnBrk="1" latinLnBrk="0" hangingPunct="1">
+              <a:lnSpc>
+                <a:spcPct val="90000"/>
+              </a:lnSpc>
+              <a:spcBef>
+                <a:spcPct val="0"/>
+              </a:spcBef>
+              <a:buNone/>
+              <a:defRPr sz="3200" kern="1200" cap="all" baseline="0">
+                <a:solidFill>
+                  <a:schemeClr val="tx1"/>
+                </a:solidFill>
+                <a:effectLst>
+                  <a:outerShdw blurRad="177800" dist="38100" dir="2700000" algn="tl">
+                    <a:srgbClr val="000000">
+                      <a:alpha val="24000"/>
+                    </a:srgbClr>
+                  </a:outerShdw>
+                </a:effectLst>
+                <a:latin typeface="+mj-lt"/>
+                <a:ea typeface="+mj-ea"/>
+                <a:cs typeface="+mj-cs"/>
+              </a:defRPr>
+            </a:lvl1pPr>
+          </a:lstStyle>
+          <a:p>
+            <a:r>
+              <a:rPr lang="en-US" dirty="0" smtClean="0">
+                <a:solidFill>
+                  <a:schemeClr val="bg2"/>
+                </a:solidFill>
+              </a:rPr>
+              <a:t/>
+            </a:r>
+            <a:br>
+              <a:rPr lang="en-US" dirty="0" smtClean="0">
+                <a:solidFill>
+                  <a:schemeClr val="bg2"/>
+                </a:solidFill>
+              </a:rPr>
+            </a:br>
+            <a:r>
+              <a:rPr lang="en-US" dirty="0" smtClean="0">
+                <a:solidFill>
+                  <a:schemeClr val="bg2"/>
+                </a:solidFill>
+              </a:rPr>
+              <a:t>Verification</a:t>
+            </a:r>
+            <a:endParaRPr lang="en-US" dirty="0">
+              <a:solidFill>
+                <a:schemeClr val="bg2"/>
+              </a:solidFill>
+            </a:endParaRPr>
+          </a:p>
+        </p:txBody>
+      </p:sp>
+      <p:sp>
+        <p:nvSpPr>
+          <p:cNvPr id="6" name="Text Placeholder 3"/>
+          <p:cNvSpPr>
+            <a:spLocks noGrp="1"/>
+          </p:cNvSpPr>
+          <p:nvPr>
+            <p:ph type="body" sz="half" idx="2"/>
+          </p:nvPr>
+        </p:nvSpPr>
+        <p:spPr>
+          <a:xfrm>
+            <a:off x="1116917" y="2061708"/>
+            <a:ext cx="5934511" cy="3541714"/>
+          </a:xfrm>
+        </p:spPr>
+        <p:txBody>
+          <a:bodyPr/>
+          <a:lstStyle/>
+          <a:p>
+            <a:pPr marL="285750" indent="-285750">
+              <a:buFont typeface="Arial" panose="020B0604020202020204" pitchFamily="34" charset="0"/>
+              <a:buChar char="•"/>
+            </a:pPr>
+            <a:r>
+              <a:rPr lang="en-US" sz="2400" dirty="0" smtClean="0">
+                <a:solidFill>
+                  <a:schemeClr val="tx2">
+                    <a:lumMod val="40000"/>
+                    <a:lumOff val="60000"/>
+                  </a:schemeClr>
+                </a:solidFill>
+              </a:rPr>
+              <a:t>Subsections of circuit were built and tested on breadboard</a:t>
+            </a:r>
+          </a:p>
+          <a:p>
+            <a:pPr marL="285750" indent="-285750">
+              <a:buFont typeface="Arial" panose="020B0604020202020204" pitchFamily="34" charset="0"/>
+              <a:buChar char="•"/>
+            </a:pPr>
+            <a:r>
+              <a:rPr lang="en-US" sz="2400" dirty="0" smtClean="0">
+                <a:solidFill>
+                  <a:schemeClr val="tx2">
+                    <a:lumMod val="40000"/>
+                    <a:lumOff val="60000"/>
+                  </a:schemeClr>
+                </a:solidFill>
+              </a:rPr>
+              <a:t>Changes such as digital output pins used, SPI connectivity, etc. stemmed from early verification work</a:t>
+            </a:r>
+            <a:endParaRPr lang="en-US" sz="2400" dirty="0" smtClean="0">
+              <a:solidFill>
+                <a:schemeClr val="tx2">
+                  <a:lumMod val="40000"/>
+                  <a:lumOff val="60000"/>
+                </a:schemeClr>
+              </a:solidFill>
+            </a:endParaRPr>
+          </a:p>
+          <a:p>
+            <a:pPr marL="742950" lvl="1" indent="-285750">
+              <a:buFont typeface="Arial" panose="020B0604020202020204" pitchFamily="34" charset="0"/>
+              <a:buChar char="•"/>
+            </a:pPr>
+            <a:endParaRPr lang="en-US" dirty="0" smtClean="0">
+              <a:solidFill>
+                <a:schemeClr val="tx2">
+                  <a:lumMod val="40000"/>
+                  <a:lumOff val="60000"/>
+                </a:schemeClr>
+              </a:solidFill>
+            </a:endParaRPr>
+          </a:p>
+          <a:p>
+            <a:pPr marL="285750" indent="-285750">
+              <a:buFont typeface="Arial" panose="020B0604020202020204" pitchFamily="34" charset="0"/>
+              <a:buChar char="•"/>
+            </a:pPr>
+            <a:endParaRPr lang="en-US" dirty="0">
+              <a:solidFill>
+                <a:schemeClr val="tx2">
+                  <a:lumMod val="40000"/>
+                  <a:lumOff val="60000"/>
+                </a:schemeClr>
+              </a:solidFill>
+            </a:endParaRPr>
+          </a:p>
+        </p:txBody>
+      </p:sp>
+    </p:spTree>
+    <p:extLst>
+      <p:ext uri="{BB962C8B-B14F-4D97-AF65-F5344CB8AC3E}">
+        <p14:creationId xmlns:p14="http://schemas.microsoft.com/office/powerpoint/2010/main" val="548595813"/>
+      </p:ext>
+    </p:extLst>
+  </p:cSld>
+  <p:clrMapOvr>
+    <a:masterClrMapping/>
+  </p:clrMapOvr>
+</p:sld>
+</file>
+
+<file path=ppt/slides/slide13.xml><?xml version="1.0" encoding="utf-8"?>
+<p:sld xmlns:a="http://schemas.openxmlformats.org/drawingml/2006/main" xmlns:r="http://schemas.openxmlformats.org/officeDocument/2006/relationships" xmlns:p="http://schemas.openxmlformats.org/presentationml/2006/main">
+  <p:cSld>
+    <p:spTree>
+      <p:nvGrpSpPr>
+        <p:cNvPr id="1" name=""/>
+        <p:cNvGrpSpPr/>
+        <p:nvPr/>
+      </p:nvGrpSpPr>
+      <p:grpSpPr>
+        <a:xfrm>
+          <a:off x="0" y="0"/>
+          <a:ext cx="0" cy="0"/>
+          <a:chOff x="0" y="0"/>
+          <a:chExt cx="0" cy="0"/>
+        </a:xfrm>
+      </p:grpSpPr>
+      <p:sp>
+        <p:nvSpPr>
           <p:cNvPr id="2" name="Title 1"/>
           <p:cNvSpPr>
             <a:spLocks noGrp="1"/>
@@ -13759,7 +13943,7 @@
         </p:nvSpPr>
         <p:spPr>
           <a:xfrm>
-            <a:off x="1217613" y="-142875"/>
+            <a:off x="678789" y="-142875"/>
             <a:ext cx="5934508" cy="1639886"/>
           </a:xfrm>
         </p:spPr>
@@ -13803,7 +13987,7 @@
                   <a:schemeClr val="bg2"/>
                 </a:solidFill>
               </a:rPr>
-              <a:t>Schematic/PCB</a:t>
+              <a:t>Schematic - POWER</a:t>
             </a:r>
             <a:endParaRPr lang="en-US" dirty="0">
               <a:solidFill>
@@ -13815,7 +13999,7 @@
       </p:sp>
       <p:pic>
         <p:nvPicPr>
-          <p:cNvPr id="20484" name="Picture 4" descr="\\khensu\Home05\mcope\Desktop\Board.png"/>
+          <p:cNvPr id="15362" name="Picture 2"/>
           <p:cNvPicPr>
             <a:picLocks noChangeAspect="1" noChangeArrowheads="1"/>
           </p:cNvPicPr>
@@ -13836,8 +14020,8 @@
         </p:blipFill>
         <p:spPr bwMode="auto">
           <a:xfrm>
-            <a:off x="6887857" y="285751"/>
-            <a:ext cx="4965775" cy="3508910"/>
+            <a:off x="505691" y="1885951"/>
+            <a:ext cx="11290792" cy="3101959"/>
           </a:xfrm>
           <a:prstGeom prst="roundRect">
             <a:avLst>
@@ -13871,306 +14055,9 @@
           <a:extLst/>
         </p:spPr>
       </p:pic>
-      <p:pic>
-        <p:nvPicPr>
-          <p:cNvPr id="15363" name="Picture 3"/>
-          <p:cNvPicPr>
-            <a:picLocks noChangeAspect="1" noChangeArrowheads="1"/>
-          </p:cNvPicPr>
-          <p:nvPr/>
-        </p:nvPicPr>
-        <p:blipFill>
-          <a:blip r:embed="rId3">
-            <a:extLst>
-              <a:ext uri="{28A0092B-C50C-407E-A947-70E740481C1C}">
-                <a14:useLocalDpi xmlns:a14="http://schemas.microsoft.com/office/drawing/2010/main" val="0"/>
-              </a:ext>
-            </a:extLst>
-          </a:blip>
-          <a:srcRect/>
-          <a:stretch>
-            <a:fillRect/>
-          </a:stretch>
-        </p:blipFill>
-        <p:spPr bwMode="auto">
-          <a:xfrm>
-            <a:off x="295216" y="1804815"/>
-            <a:ext cx="6158074" cy="4621970"/>
-          </a:xfrm>
-          <a:prstGeom prst="roundRect">
-            <a:avLst>
-              <a:gd name="adj" fmla="val 4167"/>
-            </a:avLst>
-          </a:prstGeom>
-          <a:solidFill>
-            <a:srgbClr val="FFFFFF"/>
-          </a:solidFill>
-          <a:ln w="76200" cap="sq">
-            <a:solidFill>
-              <a:srgbClr val="292929"/>
-            </a:solidFill>
-            <a:miter lim="800000"/>
-          </a:ln>
-          <a:effectLst>
-            <a:reflection blurRad="12700" stA="28000" endPos="28000" dist="5000" dir="5400000" sy="-100000" algn="bl" rotWithShape="0"/>
-          </a:effectLst>
-          <a:scene3d>
-            <a:camera prst="orthographicFront"/>
-            <a:lightRig rig="threePt" dir="t">
-              <a:rot lat="0" lon="0" rev="2700000"/>
-            </a:lightRig>
-          </a:scene3d>
-          <a:sp3d>
-            <a:bevelT h="38100"/>
-            <a:contourClr>
-              <a:srgbClr val="C0C0C0"/>
-            </a:contourClr>
-          </a:sp3d>
-          <a:extLst/>
-        </p:spPr>
-      </p:pic>
-      <p:pic>
-        <p:nvPicPr>
-          <p:cNvPr id="15362" name="Picture 2"/>
-          <p:cNvPicPr>
-            <a:picLocks noChangeAspect="1" noChangeArrowheads="1"/>
-          </p:cNvPicPr>
-          <p:nvPr/>
-        </p:nvPicPr>
-        <p:blipFill>
-          <a:blip r:embed="rId4">
-            <a:extLst>
-              <a:ext uri="{28A0092B-C50C-407E-A947-70E740481C1C}">
-                <a14:useLocalDpi xmlns:a14="http://schemas.microsoft.com/office/drawing/2010/main" val="0"/>
-              </a:ext>
-            </a:extLst>
-          </a:blip>
-          <a:srcRect/>
-          <a:stretch>
-            <a:fillRect/>
-          </a:stretch>
-        </p:blipFill>
-        <p:spPr bwMode="auto">
-          <a:xfrm>
-            <a:off x="5464903" y="4906390"/>
-            <a:ext cx="6388729" cy="1755198"/>
-          </a:xfrm>
-          <a:prstGeom prst="roundRect">
-            <a:avLst>
-              <a:gd name="adj" fmla="val 4167"/>
-            </a:avLst>
-          </a:prstGeom>
-          <a:solidFill>
-            <a:srgbClr val="FFFFFF"/>
-          </a:solidFill>
-          <a:ln w="76200" cap="sq">
-            <a:solidFill>
-              <a:srgbClr val="292929"/>
-            </a:solidFill>
-            <a:miter lim="800000"/>
-          </a:ln>
-          <a:effectLst>
-            <a:reflection blurRad="12700" stA="28000" endPos="28000" dist="5000" dir="5400000" sy="-100000" algn="bl" rotWithShape="0"/>
-          </a:effectLst>
-          <a:scene3d>
-            <a:camera prst="orthographicFront"/>
-            <a:lightRig rig="threePt" dir="t">
-              <a:rot lat="0" lon="0" rev="2700000"/>
-            </a:lightRig>
-          </a:scene3d>
-          <a:sp3d>
-            <a:bevelT h="38100"/>
-            <a:contourClr>
-              <a:srgbClr val="C0C0C0"/>
-            </a:contourClr>
-          </a:sp3d>
-          <a:extLst/>
-        </p:spPr>
-      </p:pic>
-    </p:spTree>
-    <p:extLst>
-      <p:ext uri="{BB962C8B-B14F-4D97-AF65-F5344CB8AC3E}">
-        <p14:creationId xmlns:p14="http://schemas.microsoft.com/office/powerpoint/2010/main" val="2261627834"/>
-      </p:ext>
-    </p:extLst>
-  </p:cSld>
-  <p:clrMapOvr>
-    <a:masterClrMapping/>
-  </p:clrMapOvr>
-  <p:timing>
-    <p:tnLst>
-      <p:par>
-        <p:cTn id="1" dur="indefinite" restart="never" nodeType="tmRoot"/>
-      </p:par>
-    </p:tnLst>
-  </p:timing>
-</p:sld>
-</file>
-
-<file path=ppt/slides/slide13.xml><?xml version="1.0" encoding="utf-8"?>
-<p:sld xmlns:a="http://schemas.openxmlformats.org/drawingml/2006/main" xmlns:r="http://schemas.openxmlformats.org/officeDocument/2006/relationships" xmlns:p="http://schemas.openxmlformats.org/presentationml/2006/main">
-  <p:cSld>
-    <p:spTree>
-      <p:nvGrpSpPr>
-        <p:cNvPr id="1" name=""/>
-        <p:cNvGrpSpPr/>
-        <p:nvPr/>
-      </p:nvGrpSpPr>
-      <p:grpSpPr>
-        <a:xfrm>
-          <a:off x="0" y="0"/>
-          <a:ext cx="0" cy="0"/>
-          <a:chOff x="0" y="0"/>
-          <a:chExt cx="0" cy="0"/>
-        </a:xfrm>
-      </p:grpSpPr>
       <p:sp>
         <p:nvSpPr>
-          <p:cNvPr id="2" name="Title 1"/>
-          <p:cNvSpPr>
-            <a:spLocks noGrp="1"/>
-          </p:cNvSpPr>
-          <p:nvPr>
-            <p:ph type="title"/>
-          </p:nvPr>
-        </p:nvSpPr>
-        <p:spPr/>
-        <p:txBody>
-          <a:bodyPr/>
-          <a:lstStyle/>
-          <a:p>
-            <a:r>
-              <a:rPr lang="en-US" dirty="0" smtClean="0">
-                <a:solidFill>
-                  <a:schemeClr val="bg2"/>
-                </a:solidFill>
-              </a:rPr>
-              <a:t>Intellectual property </a:t>
-            </a:r>
-            <a:br>
-              <a:rPr lang="en-US" dirty="0" smtClean="0">
-                <a:solidFill>
-                  <a:schemeClr val="bg2"/>
-                </a:solidFill>
-              </a:rPr>
-            </a:br>
-            <a:r>
-              <a:rPr lang="en-US" dirty="0" smtClean="0">
-                <a:solidFill>
-                  <a:schemeClr val="bg2"/>
-                </a:solidFill>
-              </a:rPr>
-              <a:t>prior work</a:t>
-            </a:r>
-            <a:endParaRPr lang="en-US" dirty="0">
-              <a:solidFill>
-                <a:schemeClr val="bg2"/>
-              </a:solidFill>
-            </a:endParaRPr>
-          </a:p>
-        </p:txBody>
-      </p:sp>
-      <p:sp>
-        <p:nvSpPr>
-          <p:cNvPr id="3" name="Content Placeholder 2"/>
-          <p:cNvSpPr>
-            <a:spLocks noGrp="1"/>
-          </p:cNvSpPr>
-          <p:nvPr>
-            <p:ph idx="1"/>
-          </p:nvPr>
-        </p:nvSpPr>
-        <p:spPr/>
-        <p:txBody>
-          <a:bodyPr/>
-          <a:lstStyle/>
-          <a:p>
-            <a:r>
-              <a:rPr lang="en-US" dirty="0" smtClean="0">
-                <a:solidFill>
-                  <a:schemeClr val="tx2">
-                    <a:lumMod val="40000"/>
-                    <a:lumOff val="60000"/>
-                  </a:schemeClr>
-                </a:solidFill>
-              </a:rPr>
-              <a:t>RF Modules online</a:t>
-            </a:r>
-          </a:p>
-          <a:p>
-            <a:r>
-              <a:rPr lang="en-US" dirty="0" smtClean="0">
-                <a:solidFill>
-                  <a:schemeClr val="tx2">
-                    <a:lumMod val="40000"/>
-                    <a:lumOff val="60000"/>
-                  </a:schemeClr>
-                </a:solidFill>
-              </a:rPr>
-              <a:t>Open source </a:t>
-            </a:r>
-            <a:r>
-              <a:rPr lang="en-US" dirty="0" err="1" smtClean="0">
-                <a:solidFill>
-                  <a:schemeClr val="tx2">
-                    <a:lumMod val="40000"/>
-                    <a:lumOff val="60000"/>
-                  </a:schemeClr>
-                </a:solidFill>
-              </a:rPr>
-              <a:t>Arduino</a:t>
-            </a:r>
-            <a:r>
-              <a:rPr lang="en-US" dirty="0" smtClean="0">
-                <a:solidFill>
-                  <a:schemeClr val="tx2">
-                    <a:lumMod val="40000"/>
-                    <a:lumOff val="60000"/>
-                  </a:schemeClr>
-                </a:solidFill>
-              </a:rPr>
-              <a:t> coding</a:t>
-            </a:r>
-          </a:p>
-          <a:p>
-            <a:r>
-              <a:rPr lang="en-US" dirty="0" smtClean="0">
-                <a:solidFill>
-                  <a:schemeClr val="tx2">
-                    <a:lumMod val="40000"/>
-                    <a:lumOff val="60000"/>
-                  </a:schemeClr>
-                </a:solidFill>
-              </a:rPr>
-              <a:t>Nothing proprietary</a:t>
-            </a:r>
-          </a:p>
-          <a:p>
-            <a:r>
-              <a:rPr lang="en-US" dirty="0" smtClean="0">
-                <a:solidFill>
-                  <a:schemeClr val="tx2">
-                    <a:lumMod val="40000"/>
-                    <a:lumOff val="60000"/>
-                  </a:schemeClr>
-                </a:solidFill>
-              </a:rPr>
-              <a:t>No schematics followed</a:t>
-            </a:r>
-            <a:endParaRPr lang="en-US" dirty="0">
-              <a:solidFill>
-                <a:schemeClr val="tx2">
-                  <a:lumMod val="40000"/>
-                  <a:lumOff val="60000"/>
-                </a:schemeClr>
-              </a:solidFill>
-            </a:endParaRPr>
-          </a:p>
-        </p:txBody>
-      </p:sp>
-      <p:sp>
-        <p:nvSpPr>
-          <p:cNvPr id="4" name="WordArt 2"/>
+          <p:cNvPr id="6" name="WordArt 2"/>
           <p:cNvSpPr>
             <a:spLocks noChangeArrowheads="1" noChangeShapeType="1" noTextEdit="1"/>
           </p:cNvSpPr>
@@ -14206,7 +14093,7 @@
               <a:buNone/>
             </a:pPr>
             <a:r>
-              <a:rPr lang="en-US" sz="3600" kern="10" spc="0" smtClean="0">
+              <a:rPr lang="en-US" sz="3600" kern="10" spc="0" dirty="0" err="1" smtClean="0">
                 <a:ln w="9525">
                   <a:solidFill>
                     <a:srgbClr val="000000"/>
@@ -14223,7 +14110,7 @@
               </a:rPr>
               <a:t>SignalSenders</a:t>
             </a:r>
-            <a:endParaRPr lang="en-US" sz="3600" kern="10" spc="0">
+            <a:endParaRPr lang="en-US" sz="3600" kern="10" spc="0" dirty="0">
               <a:ln w="9525">
                 <a:solidFill>
                   <a:srgbClr val="000000"/>
@@ -14244,7 +14131,7 @@
     </p:spTree>
     <p:extLst>
       <p:ext uri="{BB962C8B-B14F-4D97-AF65-F5344CB8AC3E}">
-        <p14:creationId xmlns:p14="http://schemas.microsoft.com/office/powerpoint/2010/main" val="2729189065"/>
+        <p14:creationId xmlns:p14="http://schemas.microsoft.com/office/powerpoint/2010/main" val="2283183987"/>
       </p:ext>
     </p:extLst>
   </p:cSld>
@@ -14288,9 +14175,16 @@
             <p:ph type="title"/>
           </p:nvPr>
         </p:nvSpPr>
-        <p:spPr/>
+        <p:spPr>
+          <a:xfrm>
+            <a:off x="744084" y="244935"/>
+            <a:ext cx="5934508" cy="1639886"/>
+          </a:xfrm>
+        </p:spPr>
         <p:txBody>
-          <a:bodyPr/>
+          <a:bodyPr>
+            <a:normAutofit fontScale="90000"/>
+          </a:bodyPr>
           <a:lstStyle/>
           <a:p>
             <a:r>
@@ -14299,7 +14193,52 @@
                   <a:schemeClr val="bg2"/>
                 </a:solidFill>
               </a:rPr>
-              <a:t>Testing</a:t>
+              <a:t/>
+            </a:r>
+            <a:br>
+              <a:rPr lang="en-US" dirty="0" smtClean="0">
+                <a:solidFill>
+                  <a:schemeClr val="bg2"/>
+                </a:solidFill>
+              </a:rPr>
+            </a:br>
+            <a:r>
+              <a:rPr lang="en-US" dirty="0" smtClean="0">
+                <a:solidFill>
+                  <a:schemeClr val="bg2"/>
+                </a:solidFill>
+              </a:rPr>
+              <a:t>Implementation</a:t>
+            </a:r>
+            <a:br>
+              <a:rPr lang="en-US" dirty="0" smtClean="0">
+                <a:solidFill>
+                  <a:schemeClr val="bg2"/>
+                </a:solidFill>
+              </a:rPr>
+            </a:br>
+            <a:r>
+              <a:rPr lang="en-US" dirty="0" smtClean="0">
+                <a:solidFill>
+                  <a:schemeClr val="bg2"/>
+                </a:solidFill>
+              </a:rPr>
+              <a:t>Schematic – </a:t>
+            </a:r>
+            <a:br>
+              <a:rPr lang="en-US" dirty="0" smtClean="0">
+                <a:solidFill>
+                  <a:schemeClr val="bg2"/>
+                </a:solidFill>
+              </a:rPr>
+            </a:br>
+            <a:r>
+              <a:rPr lang="en-US" dirty="0" smtClean="0">
+                <a:solidFill>
+                  <a:schemeClr val="bg2"/>
+                </a:solidFill>
+              </a:rPr>
+              <a:t>Modules</a:t>
             </a:r>
             <a:endParaRPr lang="en-US" dirty="0">
               <a:solidFill>
@@ -14309,183 +14248,67 @@
           </a:p>
         </p:txBody>
       </p:sp>
+      <p:pic>
+        <p:nvPicPr>
+          <p:cNvPr id="15363" name="Picture 3"/>
+          <p:cNvPicPr>
+            <a:picLocks noChangeAspect="1" noChangeArrowheads="1"/>
+          </p:cNvPicPr>
+          <p:nvPr/>
+        </p:nvPicPr>
+        <p:blipFill>
+          <a:blip r:embed="rId2">
+            <a:extLst>
+              <a:ext uri="{28A0092B-C50C-407E-A947-70E740481C1C}">
+                <a14:useLocalDpi xmlns:a14="http://schemas.microsoft.com/office/drawing/2010/main" val="0"/>
+              </a:ext>
+            </a:extLst>
+          </a:blip>
+          <a:srcRect/>
+          <a:stretch>
+            <a:fillRect/>
+          </a:stretch>
+        </p:blipFill>
+        <p:spPr bwMode="auto">
+          <a:xfrm>
+            <a:off x="4211794" y="489864"/>
+            <a:ext cx="7670748" cy="5757314"/>
+          </a:xfrm>
+          <a:prstGeom prst="roundRect">
+            <a:avLst>
+              <a:gd name="adj" fmla="val 4167"/>
+            </a:avLst>
+          </a:prstGeom>
+          <a:solidFill>
+            <a:srgbClr val="FFFFFF"/>
+          </a:solidFill>
+          <a:ln w="76200" cap="sq">
+            <a:solidFill>
+              <a:srgbClr val="292929"/>
+            </a:solidFill>
+            <a:miter lim="800000"/>
+          </a:ln>
+          <a:effectLst>
+            <a:reflection blurRad="12700" stA="28000" endPos="28000" dist="5000" dir="5400000" sy="-100000" algn="bl" rotWithShape="0"/>
+          </a:effectLst>
+          <a:scene3d>
+            <a:camera prst="orthographicFront"/>
+            <a:lightRig rig="threePt" dir="t">
+              <a:rot lat="0" lon="0" rev="2700000"/>
+            </a:lightRig>
+          </a:scene3d>
+          <a:sp3d>
+            <a:bevelT h="38100"/>
+            <a:contourClr>
+              <a:srgbClr val="C0C0C0"/>
+            </a:contourClr>
+          </a:sp3d>
+          <a:extLst/>
+        </p:spPr>
+      </p:pic>
       <p:sp>
         <p:nvSpPr>
-          <p:cNvPr id="6" name="Text Placeholder 5"/>
-          <p:cNvSpPr>
-            <a:spLocks noGrp="1"/>
-          </p:cNvSpPr>
-          <p:nvPr>
-            <p:ph type="body" idx="1"/>
-          </p:nvPr>
-        </p:nvSpPr>
-        <p:spPr/>
-        <p:txBody>
-          <a:bodyPr/>
-          <a:lstStyle/>
-          <a:p>
-            <a:r>
-              <a:rPr lang="en-US" dirty="0" smtClean="0">
-                <a:solidFill>
-                  <a:schemeClr val="tx2">
-                    <a:lumMod val="40000"/>
-                    <a:lumOff val="60000"/>
-                  </a:schemeClr>
-                </a:solidFill>
-              </a:rPr>
-              <a:t>Strategy</a:t>
-            </a:r>
-            <a:endParaRPr lang="en-US" dirty="0">
-              <a:solidFill>
-                <a:schemeClr val="tx2">
-                  <a:lumMod val="40000"/>
-                  <a:lumOff val="60000"/>
-                </a:schemeClr>
-              </a:solidFill>
-            </a:endParaRPr>
-          </a:p>
-        </p:txBody>
-      </p:sp>
-      <p:sp>
-        <p:nvSpPr>
-          <p:cNvPr id="7" name="Content Placeholder 6"/>
-          <p:cNvSpPr>
-            <a:spLocks noGrp="1"/>
-          </p:cNvSpPr>
-          <p:nvPr>
-            <p:ph sz="half" idx="2"/>
-          </p:nvPr>
-        </p:nvSpPr>
-        <p:spPr/>
-        <p:txBody>
-          <a:bodyPr/>
-          <a:lstStyle/>
-          <a:p>
-            <a:r>
-              <a:rPr lang="en-US" dirty="0" smtClean="0">
-                <a:solidFill>
-                  <a:schemeClr val="tx2">
-                    <a:lumMod val="40000"/>
-                    <a:lumOff val="60000"/>
-                  </a:schemeClr>
-                </a:solidFill>
-              </a:rPr>
-              <a:t>Testing power</a:t>
-            </a:r>
-          </a:p>
-          <a:p>
-            <a:r>
-              <a:rPr lang="en-US" dirty="0" smtClean="0">
-                <a:solidFill>
-                  <a:schemeClr val="tx2">
-                    <a:lumMod val="40000"/>
-                    <a:lumOff val="60000"/>
-                  </a:schemeClr>
-                </a:solidFill>
-              </a:rPr>
-              <a:t>Continuity</a:t>
-            </a:r>
-          </a:p>
-          <a:p>
-            <a:r>
-              <a:rPr lang="en-US" dirty="0" smtClean="0">
-                <a:solidFill>
-                  <a:schemeClr val="tx2">
-                    <a:lumMod val="40000"/>
-                    <a:lumOff val="60000"/>
-                  </a:schemeClr>
-                </a:solidFill>
-              </a:rPr>
-              <a:t>Layering complexity </a:t>
-            </a:r>
-            <a:endParaRPr lang="en-US" dirty="0">
-              <a:solidFill>
-                <a:schemeClr val="tx2">
-                  <a:lumMod val="40000"/>
-                  <a:lumOff val="60000"/>
-                </a:schemeClr>
-              </a:solidFill>
-            </a:endParaRPr>
-          </a:p>
-        </p:txBody>
-      </p:sp>
-      <p:sp>
-        <p:nvSpPr>
-          <p:cNvPr id="8" name="Text Placeholder 7"/>
-          <p:cNvSpPr>
-            <a:spLocks noGrp="1"/>
-          </p:cNvSpPr>
-          <p:nvPr>
-            <p:ph type="body" sz="quarter" idx="3"/>
-          </p:nvPr>
-        </p:nvSpPr>
-        <p:spPr/>
-        <p:txBody>
-          <a:bodyPr/>
-          <a:lstStyle/>
-          <a:p>
-            <a:r>
-              <a:rPr lang="en-US" dirty="0" smtClean="0">
-                <a:solidFill>
-                  <a:schemeClr val="tx2">
-                    <a:lumMod val="40000"/>
-                    <a:lumOff val="60000"/>
-                  </a:schemeClr>
-                </a:solidFill>
-              </a:rPr>
-              <a:t>Execution</a:t>
-            </a:r>
-            <a:endParaRPr lang="en-US" dirty="0">
-              <a:solidFill>
-                <a:schemeClr val="tx2">
-                  <a:lumMod val="40000"/>
-                  <a:lumOff val="60000"/>
-                </a:schemeClr>
-              </a:solidFill>
-            </a:endParaRPr>
-          </a:p>
-        </p:txBody>
-      </p:sp>
-      <p:sp>
-        <p:nvSpPr>
-          <p:cNvPr id="9" name="Content Placeholder 8"/>
-          <p:cNvSpPr>
-            <a:spLocks noGrp="1"/>
-          </p:cNvSpPr>
-          <p:nvPr>
-            <p:ph sz="quarter" idx="4"/>
-          </p:nvPr>
-        </p:nvSpPr>
-        <p:spPr/>
-        <p:txBody>
-          <a:bodyPr/>
-          <a:lstStyle/>
-          <a:p>
-            <a:r>
-              <a:rPr lang="en-US" dirty="0" smtClean="0">
-                <a:solidFill>
-                  <a:schemeClr val="tx2">
-                    <a:lumMod val="40000"/>
-                    <a:lumOff val="60000"/>
-                  </a:schemeClr>
-                </a:solidFill>
-              </a:rPr>
-              <a:t>Talk about issues/lack there of</a:t>
-            </a:r>
-            <a:endParaRPr lang="en-US" dirty="0">
-              <a:solidFill>
-                <a:schemeClr val="tx2">
-                  <a:lumMod val="40000"/>
-                  <a:lumOff val="60000"/>
-                </a:schemeClr>
-              </a:solidFill>
-            </a:endParaRPr>
-          </a:p>
-        </p:txBody>
-      </p:sp>
-      <p:sp>
-        <p:nvSpPr>
-          <p:cNvPr id="10" name="WordArt 2"/>
+          <p:cNvPr id="6" name="WordArt 2"/>
           <p:cNvSpPr>
             <a:spLocks noChangeArrowheads="1" noChangeShapeType="1" noTextEdit="1"/>
           </p:cNvSpPr>
@@ -14521,7 +14344,7 @@
               <a:buNone/>
             </a:pPr>
             <a:r>
-              <a:rPr lang="en-US" sz="3600" kern="10" spc="0" smtClean="0">
+              <a:rPr lang="en-US" sz="3600" kern="10" spc="0" dirty="0" err="1" smtClean="0">
                 <a:ln w="9525">
                   <a:solidFill>
                     <a:srgbClr val="000000"/>
@@ -14538,7 +14361,7 @@
               </a:rPr>
               <a:t>SignalSenders</a:t>
             </a:r>
-            <a:endParaRPr lang="en-US" sz="3600" kern="10" spc="0">
+            <a:endParaRPr lang="en-US" sz="3600" kern="10" spc="0" dirty="0">
               <a:ln w="9525">
                 <a:solidFill>
                   <a:srgbClr val="000000"/>
@@ -14559,7 +14382,7 @@
     </p:spTree>
     <p:extLst>
       <p:ext uri="{BB962C8B-B14F-4D97-AF65-F5344CB8AC3E}">
-        <p14:creationId xmlns:p14="http://schemas.microsoft.com/office/powerpoint/2010/main" val="704021232"/>
+        <p14:creationId xmlns:p14="http://schemas.microsoft.com/office/powerpoint/2010/main" val="2283183987"/>
       </p:ext>
     </p:extLst>
   </p:cSld>
@@ -14603,7 +14426,12 @@
             <p:ph type="title"/>
           </p:nvPr>
         </p:nvSpPr>
-        <p:spPr/>
+        <p:spPr>
+          <a:xfrm>
+            <a:off x="686953" y="-142875"/>
+            <a:ext cx="5934508" cy="1639886"/>
+          </a:xfrm>
+        </p:spPr>
         <p:txBody>
           <a:bodyPr/>
           <a:lstStyle/>
@@ -14614,7 +14442,37 @@
                   <a:schemeClr val="bg2"/>
                 </a:solidFill>
               </a:rPr>
-              <a:t>Results</a:t>
+              <a:t/>
+            </a:r>
+            <a:br>
+              <a:rPr lang="en-US" dirty="0" smtClean="0">
+                <a:solidFill>
+                  <a:schemeClr val="bg2"/>
+                </a:solidFill>
+              </a:rPr>
+            </a:br>
+            <a:r>
+              <a:rPr lang="en-US" dirty="0" smtClean="0">
+                <a:solidFill>
+                  <a:schemeClr val="bg2"/>
+                </a:solidFill>
+              </a:rPr>
+              <a:t>Implementation</a:t>
+            </a:r>
+            <a:br>
+              <a:rPr lang="en-US" dirty="0" smtClean="0">
+                <a:solidFill>
+                  <a:schemeClr val="bg2"/>
+                </a:solidFill>
+              </a:rPr>
+            </a:br>
+            <a:r>
+              <a:rPr lang="en-US" dirty="0" smtClean="0">
+                <a:solidFill>
+                  <a:schemeClr val="bg2"/>
+                </a:solidFill>
+              </a:rPr>
+              <a:t>PCB</a:t>
             </a:r>
             <a:endParaRPr lang="en-US" dirty="0">
               <a:solidFill>
@@ -14624,58 +14482,67 @@
           </a:p>
         </p:txBody>
       </p:sp>
+      <p:pic>
+        <p:nvPicPr>
+          <p:cNvPr id="20484" name="Picture 4" descr="\\khensu\Home05\mcope\Desktop\Board.png"/>
+          <p:cNvPicPr>
+            <a:picLocks noChangeAspect="1" noChangeArrowheads="1"/>
+          </p:cNvPicPr>
+          <p:nvPr/>
+        </p:nvPicPr>
+        <p:blipFill>
+          <a:blip r:embed="rId2">
+            <a:extLst>
+              <a:ext uri="{28A0092B-C50C-407E-A947-70E740481C1C}">
+                <a14:useLocalDpi xmlns:a14="http://schemas.microsoft.com/office/drawing/2010/main" val="0"/>
+              </a:ext>
+            </a:extLst>
+          </a:blip>
+          <a:srcRect/>
+          <a:stretch>
+            <a:fillRect/>
+          </a:stretch>
+        </p:blipFill>
+        <p:spPr bwMode="auto">
+          <a:xfrm>
+            <a:off x="2324020" y="1601064"/>
+            <a:ext cx="6836307" cy="4830663"/>
+          </a:xfrm>
+          <a:prstGeom prst="roundRect">
+            <a:avLst>
+              <a:gd name="adj" fmla="val 4167"/>
+            </a:avLst>
+          </a:prstGeom>
+          <a:solidFill>
+            <a:srgbClr val="FFFFFF"/>
+          </a:solidFill>
+          <a:ln w="76200" cap="sq">
+            <a:solidFill>
+              <a:srgbClr val="292929"/>
+            </a:solidFill>
+            <a:miter lim="800000"/>
+          </a:ln>
+          <a:effectLst>
+            <a:reflection blurRad="12700" stA="28000" endPos="28000" dist="5000" dir="5400000" sy="-100000" algn="bl" rotWithShape="0"/>
+          </a:effectLst>
+          <a:scene3d>
+            <a:camera prst="orthographicFront"/>
+            <a:lightRig rig="threePt" dir="t">
+              <a:rot lat="0" lon="0" rev="2700000"/>
+            </a:lightRig>
+          </a:scene3d>
+          <a:sp3d>
+            <a:bevelT h="38100"/>
+            <a:contourClr>
+              <a:srgbClr val="C0C0C0"/>
+            </a:contourClr>
+          </a:sp3d>
+          <a:extLst/>
+        </p:spPr>
+      </p:pic>
       <p:sp>
         <p:nvSpPr>
-          <p:cNvPr id="3" name="Picture Placeholder 2"/>
-          <p:cNvSpPr>
-            <a:spLocks noGrp="1"/>
-          </p:cNvSpPr>
-          <p:nvPr>
-            <p:ph type="pic" idx="1"/>
-          </p:nvPr>
-        </p:nvSpPr>
-        <p:spPr/>
-      </p:sp>
-      <p:sp>
-        <p:nvSpPr>
-          <p:cNvPr id="4" name="Text Placeholder 3"/>
-          <p:cNvSpPr>
-            <a:spLocks noGrp="1"/>
-          </p:cNvSpPr>
-          <p:nvPr>
-            <p:ph type="body" sz="half" idx="2"/>
-          </p:nvPr>
-        </p:nvSpPr>
-        <p:spPr/>
-        <p:txBody>
-          <a:bodyPr/>
-          <a:lstStyle/>
-          <a:p>
-            <a:r>
-              <a:rPr lang="en-US" dirty="0" smtClean="0">
-                <a:solidFill>
-                  <a:schemeClr val="tx2">
-                    <a:lumMod val="40000"/>
-                    <a:lumOff val="60000"/>
-                  </a:schemeClr>
-                </a:solidFill>
-              </a:rPr>
-              <a:t>4 working units (video potential?)</a:t>
-            </a:r>
-            <a:endParaRPr lang="en-US" dirty="0">
-              <a:solidFill>
-                <a:schemeClr val="tx2">
-                  <a:lumMod val="40000"/>
-                  <a:lumOff val="60000"/>
-                </a:schemeClr>
-              </a:solidFill>
-            </a:endParaRPr>
-          </a:p>
-        </p:txBody>
-      </p:sp>
-      <p:sp>
-        <p:nvSpPr>
-          <p:cNvPr id="5" name="WordArt 2"/>
+          <p:cNvPr id="6" name="WordArt 2"/>
           <p:cNvSpPr>
             <a:spLocks noChangeArrowheads="1" noChangeShapeType="1" noTextEdit="1"/>
           </p:cNvSpPr>
@@ -14711,7 +14578,7 @@
               <a:buNone/>
             </a:pPr>
             <a:r>
-              <a:rPr lang="en-US" sz="3600" kern="10" spc="0" smtClean="0">
+              <a:rPr lang="en-US" sz="3600" kern="10" spc="0" dirty="0" err="1" smtClean="0">
                 <a:ln w="9525">
                   <a:solidFill>
                     <a:srgbClr val="000000"/>
@@ -14728,7 +14595,7 @@
               </a:rPr>
               <a:t>SignalSenders</a:t>
             </a:r>
-            <a:endParaRPr lang="en-US" sz="3600" kern="10" spc="0">
+            <a:endParaRPr lang="en-US" sz="3600" kern="10" spc="0" dirty="0">
               <a:ln w="9525">
                 <a:solidFill>
                   <a:srgbClr val="000000"/>
@@ -14749,7 +14616,7 @@
     </p:spTree>
     <p:extLst>
       <p:ext uri="{BB962C8B-B14F-4D97-AF65-F5344CB8AC3E}">
-        <p14:creationId xmlns:p14="http://schemas.microsoft.com/office/powerpoint/2010/main" val="1772790167"/>
+        <p14:creationId xmlns:p14="http://schemas.microsoft.com/office/powerpoint/2010/main" val="2261627834"/>
       </p:ext>
     </p:extLst>
   </p:cSld>
@@ -14804,7 +14671,22 @@
                   <a:schemeClr val="bg2"/>
                 </a:solidFill>
               </a:rPr>
-              <a:t>Contributions</a:t>
+              <a:t>Intellectual property </a:t>
+            </a:r>
+            <a:br>
+              <a:rPr lang="en-US" dirty="0" smtClean="0">
+                <a:solidFill>
+                  <a:schemeClr val="bg2"/>
+                </a:solidFill>
+              </a:rPr>
+            </a:br>
+            <a:r>
+              <a:rPr lang="en-US" dirty="0" smtClean="0">
+                <a:solidFill>
+                  <a:schemeClr val="bg2"/>
+                </a:solidFill>
+              </a:rPr>
+              <a:t>prior work</a:t>
             </a:r>
             <a:endParaRPr lang="en-US" dirty="0">
               <a:solidFill>
@@ -14816,12 +14698,12 @@
       </p:sp>
       <p:sp>
         <p:nvSpPr>
-          <p:cNvPr id="3" name="Text Placeholder 2"/>
+          <p:cNvPr id="3" name="Content Placeholder 2"/>
           <p:cNvSpPr>
             <a:spLocks noGrp="1"/>
           </p:cNvSpPr>
           <p:nvPr>
-            <p:ph type="body" idx="1"/>
+            <p:ph idx="1"/>
           </p:nvPr>
         </p:nvSpPr>
         <p:spPr/>
@@ -14830,7 +14712,7 @@
           <a:lstStyle/>
           <a:p>
             <a:r>
-              <a:rPr lang="en-US" sz="2800" dirty="0" smtClean="0">
+              <a:rPr lang="en-US" dirty="0" smtClean="0">
                 <a:solidFill>
                   <a:schemeClr val="tx2">
                     <a:lumMod val="40000"/>
@@ -14838,9 +14720,20 @@
                   </a:schemeClr>
                 </a:solidFill>
               </a:rPr>
-              <a:t>Max cope</a:t>
-            </a:r>
-            <a:endParaRPr lang="en-US" sz="2800" dirty="0">
+              <a:t>RF </a:t>
+            </a:r>
+            <a:r>
+              <a:rPr lang="en-US" dirty="0" smtClean="0">
+                <a:solidFill>
+                  <a:schemeClr val="tx2">
+                    <a:lumMod val="40000"/>
+                    <a:lumOff val="60000"/>
+                  </a:schemeClr>
+                </a:solidFill>
+              </a:rPr>
+              <a:t>Module libraries found online</a:t>
+            </a:r>
+            <a:endParaRPr lang="en-US" dirty="0" smtClean="0">
               <a:solidFill>
                 <a:schemeClr val="tx2">
                   <a:lumMod val="40000"/>
@@ -14849,31 +14742,9 @@
               </a:solidFill>
             </a:endParaRPr>
           </a:p>
-        </p:txBody>
-      </p:sp>
-      <p:sp>
-        <p:nvSpPr>
-          <p:cNvPr id="4" name="Text Placeholder 3"/>
-          <p:cNvSpPr>
-            <a:spLocks noGrp="1"/>
-          </p:cNvSpPr>
-          <p:nvPr>
-            <p:ph type="body" sz="half" idx="15"/>
-          </p:nvPr>
-        </p:nvSpPr>
-        <p:spPr/>
-        <p:txBody>
-          <a:bodyPr>
-            <a:normAutofit/>
-          </a:bodyPr>
-          <a:lstStyle/>
-          <a:p>
-            <a:pPr marL="285750" indent="-285750">
-              <a:buFont typeface="Arial" panose="020B0604020202020204" pitchFamily="34" charset="0"/>
-              <a:buChar char="•"/>
-            </a:pPr>
-            <a:r>
-              <a:rPr lang="en-US" sz="2000" dirty="0" smtClean="0">
+          <a:p>
+            <a:r>
+              <a:rPr lang="en-US" dirty="0" smtClean="0">
                 <a:solidFill>
                   <a:schemeClr val="tx2">
                     <a:lumMod val="40000"/>
@@ -14881,16 +14752,12 @@
                   </a:schemeClr>
                 </a:solidFill>
               </a:rPr>
-              <a:t>RF signals</a:t>
-            </a:r>
-          </a:p>
-          <a:p>
-            <a:pPr marL="285750" indent="-285750">
-              <a:buFont typeface="Arial" panose="020B0604020202020204" pitchFamily="34" charset="0"/>
-              <a:buChar char="•"/>
-            </a:pPr>
-            <a:r>
-              <a:rPr lang="en-US" sz="2000" dirty="0" smtClean="0">
+              <a:t>Open source Arduino coding</a:t>
+            </a:r>
+          </a:p>
+          <a:p>
+            <a:r>
+              <a:rPr lang="en-US" dirty="0" smtClean="0">
                 <a:solidFill>
                   <a:schemeClr val="tx2">
                     <a:lumMod val="40000"/>
@@ -14898,9 +14765,20 @@
                   </a:schemeClr>
                 </a:solidFill>
               </a:rPr>
-              <a:t>RF Firmware</a:t>
-            </a:r>
-            <a:endParaRPr lang="en-US" sz="2000" dirty="0">
+              <a:t>Nothing </a:t>
+            </a:r>
+            <a:r>
+              <a:rPr lang="en-US" dirty="0" smtClean="0">
+                <a:solidFill>
+                  <a:schemeClr val="tx2">
+                    <a:lumMod val="40000"/>
+                    <a:lumOff val="60000"/>
+                  </a:schemeClr>
+                </a:solidFill>
+              </a:rPr>
+              <a:t>proprietary created</a:t>
+            </a:r>
+            <a:endParaRPr lang="en-US" dirty="0" smtClean="0">
               <a:solidFill>
                 <a:schemeClr val="tx2">
                   <a:lumMod val="40000"/>
@@ -14909,25 +14787,9 @@
               </a:solidFill>
             </a:endParaRPr>
           </a:p>
-        </p:txBody>
-      </p:sp>
-      <p:sp>
-        <p:nvSpPr>
-          <p:cNvPr id="5" name="Text Placeholder 4"/>
-          <p:cNvSpPr>
-            <a:spLocks noGrp="1"/>
-          </p:cNvSpPr>
-          <p:nvPr>
-            <p:ph type="body" sz="quarter" idx="3"/>
-          </p:nvPr>
-        </p:nvSpPr>
-        <p:spPr/>
-        <p:txBody>
-          <a:bodyPr/>
-          <a:lstStyle/>
-          <a:p>
-            <a:r>
-              <a:rPr lang="en-US" sz="2800" dirty="0" smtClean="0">
+          <a:p>
+            <a:r>
+              <a:rPr lang="en-US" dirty="0" smtClean="0">
                 <a:solidFill>
                   <a:schemeClr val="tx2">
                     <a:lumMod val="40000"/>
@@ -14935,9 +14797,9 @@
                   </a:schemeClr>
                 </a:solidFill>
               </a:rPr>
-              <a:t>Leslie Eide</a:t>
-            </a:r>
-            <a:endParaRPr lang="en-US" sz="2800" dirty="0">
+              <a:t>No schematics followed</a:t>
+            </a:r>
+            <a:endParaRPr lang="en-US" dirty="0">
               <a:solidFill>
                 <a:schemeClr val="tx2">
                   <a:lumMod val="40000"/>
@@ -14950,169 +14812,7 @@
       </p:sp>
       <p:sp>
         <p:nvSpPr>
-          <p:cNvPr id="6" name="Text Placeholder 5"/>
-          <p:cNvSpPr>
-            <a:spLocks noGrp="1"/>
-          </p:cNvSpPr>
-          <p:nvPr>
-            <p:ph type="body" sz="half" idx="16"/>
-          </p:nvPr>
-        </p:nvSpPr>
-        <p:spPr/>
-        <p:txBody>
-          <a:bodyPr>
-            <a:normAutofit/>
-          </a:bodyPr>
-          <a:lstStyle/>
-          <a:p>
-            <a:pPr marL="285750" indent="-285750">
-              <a:buFont typeface="Arial" panose="020B0604020202020204" pitchFamily="34" charset="0"/>
-              <a:buChar char="•"/>
-            </a:pPr>
-            <a:r>
-              <a:rPr lang="en-US" sz="2000" dirty="0" smtClean="0">
-                <a:solidFill>
-                  <a:schemeClr val="tx2">
-                    <a:lumMod val="40000"/>
-                    <a:lumOff val="60000"/>
-                  </a:schemeClr>
-                </a:solidFill>
-              </a:rPr>
-              <a:t>IR motion detector</a:t>
-            </a:r>
-          </a:p>
-          <a:p>
-            <a:pPr marL="285750" indent="-285750">
-              <a:buFont typeface="Arial" panose="020B0604020202020204" pitchFamily="34" charset="0"/>
-              <a:buChar char="•"/>
-            </a:pPr>
-            <a:r>
-              <a:rPr lang="en-US" sz="2000" dirty="0" smtClean="0">
-                <a:solidFill>
-                  <a:schemeClr val="tx2">
-                    <a:lumMod val="40000"/>
-                    <a:lumOff val="60000"/>
-                  </a:schemeClr>
-                </a:solidFill>
-              </a:rPr>
-              <a:t>LED output panel</a:t>
-            </a:r>
-            <a:endParaRPr lang="en-US" sz="2000" dirty="0">
-              <a:solidFill>
-                <a:schemeClr val="tx2">
-                  <a:lumMod val="40000"/>
-                  <a:lumOff val="60000"/>
-                </a:schemeClr>
-              </a:solidFill>
-            </a:endParaRPr>
-          </a:p>
-        </p:txBody>
-      </p:sp>
-      <p:sp>
-        <p:nvSpPr>
-          <p:cNvPr id="7" name="Text Placeholder 6"/>
-          <p:cNvSpPr>
-            <a:spLocks noGrp="1"/>
-          </p:cNvSpPr>
-          <p:nvPr>
-            <p:ph type="body" sz="quarter" idx="13"/>
-          </p:nvPr>
-        </p:nvSpPr>
-        <p:spPr>
-          <a:xfrm>
-            <a:off x="7852441" y="2674463"/>
-            <a:ext cx="3935005" cy="685800"/>
-          </a:xfrm>
-        </p:spPr>
-        <p:txBody>
-          <a:bodyPr/>
-          <a:lstStyle/>
-          <a:p>
-            <a:r>
-              <a:rPr lang="en-US" sz="2800" dirty="0" smtClean="0">
-                <a:solidFill>
-                  <a:schemeClr val="tx2">
-                    <a:lumMod val="40000"/>
-                    <a:lumOff val="60000"/>
-                  </a:schemeClr>
-                </a:solidFill>
-              </a:rPr>
-              <a:t>Chris Klupenger</a:t>
-            </a:r>
-            <a:endParaRPr lang="en-US" sz="2800" dirty="0">
-              <a:solidFill>
-                <a:schemeClr val="tx2">
-                  <a:lumMod val="40000"/>
-                  <a:lumOff val="60000"/>
-                </a:schemeClr>
-              </a:solidFill>
-            </a:endParaRPr>
-          </a:p>
-        </p:txBody>
-      </p:sp>
-      <p:sp>
-        <p:nvSpPr>
-          <p:cNvPr id="8" name="Text Placeholder 7"/>
-          <p:cNvSpPr>
-            <a:spLocks noGrp="1"/>
-          </p:cNvSpPr>
-          <p:nvPr>
-            <p:ph type="body" sz="half" idx="17"/>
-          </p:nvPr>
-        </p:nvSpPr>
-        <p:spPr/>
-        <p:txBody>
-          <a:bodyPr>
-            <a:normAutofit/>
-          </a:bodyPr>
-          <a:lstStyle/>
-          <a:p>
-            <a:pPr marL="285750" indent="-285750">
-              <a:buFont typeface="Arial" panose="020B0604020202020204" pitchFamily="34" charset="0"/>
-              <a:buChar char="•"/>
-            </a:pPr>
-            <a:r>
-              <a:rPr lang="en-US" sz="2000" dirty="0" smtClean="0">
-                <a:solidFill>
-                  <a:schemeClr val="tx2">
-                    <a:lumMod val="40000"/>
-                    <a:lumOff val="60000"/>
-                  </a:schemeClr>
-                </a:solidFill>
-              </a:rPr>
-              <a:t>Microcontroller</a:t>
-            </a:r>
-          </a:p>
-          <a:p>
-            <a:pPr marL="285750" indent="-285750">
-              <a:buFont typeface="Arial" panose="020B0604020202020204" pitchFamily="34" charset="0"/>
-              <a:buChar char="•"/>
-            </a:pPr>
-            <a:r>
-              <a:rPr lang="en-US" sz="2000" dirty="0" smtClean="0">
-                <a:solidFill>
-                  <a:schemeClr val="tx2">
-                    <a:lumMod val="40000"/>
-                    <a:lumOff val="60000"/>
-                  </a:schemeClr>
-                </a:solidFill>
-              </a:rPr>
-              <a:t>Programming</a:t>
-            </a:r>
-            <a:endParaRPr lang="en-US" sz="2000" dirty="0">
-              <a:solidFill>
-                <a:schemeClr val="tx2">
-                  <a:lumMod val="40000"/>
-                  <a:lumOff val="60000"/>
-                </a:schemeClr>
-              </a:solidFill>
-            </a:endParaRPr>
-          </a:p>
-        </p:txBody>
-      </p:sp>
-      <p:sp>
-        <p:nvSpPr>
-          <p:cNvPr id="9" name="WordArt 2"/>
+          <p:cNvPr id="4" name="WordArt 2"/>
           <p:cNvSpPr>
             <a:spLocks noChangeArrowheads="1" noChangeShapeType="1" noTextEdit="1"/>
           </p:cNvSpPr>
@@ -15186,7 +14886,7 @@
     </p:spTree>
     <p:extLst>
       <p:ext uri="{BB962C8B-B14F-4D97-AF65-F5344CB8AC3E}">
-        <p14:creationId xmlns:p14="http://schemas.microsoft.com/office/powerpoint/2010/main" val="854377500"/>
+        <p14:creationId xmlns:p14="http://schemas.microsoft.com/office/powerpoint/2010/main" val="2729189065"/>
       </p:ext>
     </p:extLst>
   </p:cSld>
@@ -15230,12 +14930,7 @@
             <p:ph type="title"/>
           </p:nvPr>
         </p:nvSpPr>
-        <p:spPr>
-          <a:xfrm>
-            <a:off x="1555029" y="76200"/>
-            <a:ext cx="9056686" cy="2314575"/>
-          </a:xfrm>
-        </p:spPr>
+        <p:spPr/>
         <p:txBody>
           <a:bodyPr/>
           <a:lstStyle/>
@@ -15246,7 +14941,7 @@
                   <a:schemeClr val="bg2"/>
                 </a:solidFill>
               </a:rPr>
-              <a:t>Lessons Learned</a:t>
+              <a:t>Testing</a:t>
             </a:r>
             <a:endParaRPr lang="en-US" dirty="0">
               <a:solidFill>
@@ -15258,12 +14953,12 @@
       </p:sp>
       <p:sp>
         <p:nvSpPr>
-          <p:cNvPr id="3" name="Text Placeholder 2"/>
+          <p:cNvPr id="6" name="Text Placeholder 5"/>
           <p:cNvSpPr>
             <a:spLocks noGrp="1"/>
           </p:cNvSpPr>
           <p:nvPr>
-            <p:ph type="body" sz="half" idx="2"/>
+            <p:ph type="body" idx="1"/>
           </p:nvPr>
         </p:nvSpPr>
         <p:spPr/>
@@ -15271,6 +14966,17 @@
           <a:bodyPr/>
           <a:lstStyle/>
           <a:p>
+            <a:r>
+              <a:rPr lang="en-US" dirty="0" smtClean="0">
+                <a:solidFill>
+                  <a:schemeClr val="tx2">
+                    <a:lumMod val="40000"/>
+                    <a:lumOff val="60000"/>
+                  </a:schemeClr>
+                </a:solidFill>
+              </a:rPr>
+              <a:t>Strategy</a:t>
+            </a:r>
             <a:endParaRPr lang="en-US" dirty="0">
               <a:solidFill>
                 <a:schemeClr val="tx2">
@@ -15284,7 +14990,144 @@
       </p:sp>
       <p:sp>
         <p:nvSpPr>
-          <p:cNvPr id="4" name="WordArt 2"/>
+          <p:cNvPr id="7" name="Content Placeholder 6"/>
+          <p:cNvSpPr>
+            <a:spLocks noGrp="1"/>
+          </p:cNvSpPr>
+          <p:nvPr>
+            <p:ph sz="half" idx="2"/>
+          </p:nvPr>
+        </p:nvSpPr>
+        <p:spPr/>
+        <p:txBody>
+          <a:bodyPr/>
+          <a:lstStyle/>
+          <a:p>
+            <a:r>
+              <a:rPr lang="en-US" dirty="0" smtClean="0">
+                <a:solidFill>
+                  <a:schemeClr val="tx2">
+                    <a:lumMod val="40000"/>
+                    <a:lumOff val="60000"/>
+                  </a:schemeClr>
+                </a:solidFill>
+              </a:rPr>
+              <a:t>Testing power</a:t>
+            </a:r>
+          </a:p>
+          <a:p>
+            <a:r>
+              <a:rPr lang="en-US" dirty="0" smtClean="0">
+                <a:solidFill>
+                  <a:schemeClr val="tx2">
+                    <a:lumMod val="40000"/>
+                    <a:lumOff val="60000"/>
+                  </a:schemeClr>
+                </a:solidFill>
+              </a:rPr>
+              <a:t>Continuity</a:t>
+            </a:r>
+          </a:p>
+          <a:p>
+            <a:r>
+              <a:rPr lang="en-US" dirty="0" smtClean="0">
+                <a:solidFill>
+                  <a:schemeClr val="tx2">
+                    <a:lumMod val="40000"/>
+                    <a:lumOff val="60000"/>
+                  </a:schemeClr>
+                </a:solidFill>
+              </a:rPr>
+              <a:t>Layering complexity </a:t>
+            </a:r>
+            <a:endParaRPr lang="en-US" dirty="0">
+              <a:solidFill>
+                <a:schemeClr val="tx2">
+                  <a:lumMod val="40000"/>
+                  <a:lumOff val="60000"/>
+                </a:schemeClr>
+              </a:solidFill>
+            </a:endParaRPr>
+          </a:p>
+        </p:txBody>
+      </p:sp>
+      <p:sp>
+        <p:nvSpPr>
+          <p:cNvPr id="8" name="Text Placeholder 7"/>
+          <p:cNvSpPr>
+            <a:spLocks noGrp="1"/>
+          </p:cNvSpPr>
+          <p:nvPr>
+            <p:ph type="body" sz="quarter" idx="3"/>
+          </p:nvPr>
+        </p:nvSpPr>
+        <p:spPr/>
+        <p:txBody>
+          <a:bodyPr/>
+          <a:lstStyle/>
+          <a:p>
+            <a:r>
+              <a:rPr lang="en-US" dirty="0" smtClean="0">
+                <a:solidFill>
+                  <a:schemeClr val="tx2">
+                    <a:lumMod val="40000"/>
+                    <a:lumOff val="60000"/>
+                  </a:schemeClr>
+                </a:solidFill>
+              </a:rPr>
+              <a:t>Execution</a:t>
+            </a:r>
+            <a:endParaRPr lang="en-US" dirty="0">
+              <a:solidFill>
+                <a:schemeClr val="tx2">
+                  <a:lumMod val="40000"/>
+                  <a:lumOff val="60000"/>
+                </a:schemeClr>
+              </a:solidFill>
+            </a:endParaRPr>
+          </a:p>
+        </p:txBody>
+      </p:sp>
+      <p:sp>
+        <p:nvSpPr>
+          <p:cNvPr id="9" name="Content Placeholder 8"/>
+          <p:cNvSpPr>
+            <a:spLocks noGrp="1"/>
+          </p:cNvSpPr>
+          <p:nvPr>
+            <p:ph sz="quarter" idx="4"/>
+          </p:nvPr>
+        </p:nvSpPr>
+        <p:spPr/>
+        <p:txBody>
+          <a:bodyPr/>
+          <a:lstStyle/>
+          <a:p>
+            <a:r>
+              <a:rPr lang="en-US" dirty="0" smtClean="0">
+                <a:solidFill>
+                  <a:schemeClr val="tx2">
+                    <a:lumMod val="40000"/>
+                    <a:lumOff val="60000"/>
+                  </a:schemeClr>
+                </a:solidFill>
+              </a:rPr>
+              <a:t>Talk about issues/lack there of</a:t>
+            </a:r>
+            <a:endParaRPr lang="en-US" dirty="0">
+              <a:solidFill>
+                <a:schemeClr val="tx2">
+                  <a:lumMod val="40000"/>
+                  <a:lumOff val="60000"/>
+                </a:schemeClr>
+              </a:solidFill>
+            </a:endParaRPr>
+          </a:p>
+        </p:txBody>
+      </p:sp>
+      <p:sp>
+        <p:nvSpPr>
+          <p:cNvPr id="10" name="WordArt 2"/>
           <p:cNvSpPr>
             <a:spLocks noChangeArrowheads="1" noChangeShapeType="1" noTextEdit="1"/>
           </p:cNvSpPr>
@@ -15358,7 +15201,634 @@
     </p:spTree>
     <p:extLst>
       <p:ext uri="{BB962C8B-B14F-4D97-AF65-F5344CB8AC3E}">
-        <p14:creationId xmlns:p14="http://schemas.microsoft.com/office/powerpoint/2010/main" val="1572304002"/>
+        <p14:creationId xmlns:p14="http://schemas.microsoft.com/office/powerpoint/2010/main" val="704021232"/>
+      </p:ext>
+    </p:extLst>
+  </p:cSld>
+  <p:clrMapOvr>
+    <a:masterClrMapping/>
+  </p:clrMapOvr>
+  <p:timing>
+    <p:tnLst>
+      <p:par>
+        <p:cTn id="1" dur="indefinite" restart="never" nodeType="tmRoot"/>
+      </p:par>
+    </p:tnLst>
+  </p:timing>
+</p:sld>
+</file>
+
+<file path=ppt/slides/slide18.xml><?xml version="1.0" encoding="utf-8"?>
+<p:sld xmlns:a="http://schemas.openxmlformats.org/drawingml/2006/main" xmlns:r="http://schemas.openxmlformats.org/officeDocument/2006/relationships" xmlns:p="http://schemas.openxmlformats.org/presentationml/2006/main">
+  <p:cSld>
+    <p:spTree>
+      <p:nvGrpSpPr>
+        <p:cNvPr id="1" name=""/>
+        <p:cNvGrpSpPr/>
+        <p:nvPr/>
+      </p:nvGrpSpPr>
+      <p:grpSpPr>
+        <a:xfrm>
+          <a:off x="0" y="0"/>
+          <a:ext cx="0" cy="0"/>
+          <a:chOff x="0" y="0"/>
+          <a:chExt cx="0" cy="0"/>
+        </a:xfrm>
+      </p:grpSpPr>
+      <p:sp>
+        <p:nvSpPr>
+          <p:cNvPr id="2" name="Title 1"/>
+          <p:cNvSpPr>
+            <a:spLocks noGrp="1"/>
+          </p:cNvSpPr>
+          <p:nvPr>
+            <p:ph type="title"/>
+          </p:nvPr>
+        </p:nvSpPr>
+        <p:spPr/>
+        <p:txBody>
+          <a:bodyPr/>
+          <a:lstStyle/>
+          <a:p>
+            <a:r>
+              <a:rPr lang="en-US" dirty="0" smtClean="0">
+                <a:solidFill>
+                  <a:schemeClr val="bg2"/>
+                </a:solidFill>
+              </a:rPr>
+              <a:t>Results</a:t>
+            </a:r>
+            <a:endParaRPr lang="en-US" dirty="0">
+              <a:solidFill>
+                <a:schemeClr val="bg2"/>
+              </a:solidFill>
+            </a:endParaRPr>
+          </a:p>
+        </p:txBody>
+      </p:sp>
+      <p:sp>
+        <p:nvSpPr>
+          <p:cNvPr id="3" name="Picture Placeholder 2"/>
+          <p:cNvSpPr>
+            <a:spLocks noGrp="1"/>
+          </p:cNvSpPr>
+          <p:nvPr>
+            <p:ph type="pic" idx="1"/>
+          </p:nvPr>
+        </p:nvSpPr>
+        <p:spPr/>
+      </p:sp>
+      <p:sp>
+        <p:nvSpPr>
+          <p:cNvPr id="4" name="Text Placeholder 3"/>
+          <p:cNvSpPr>
+            <a:spLocks noGrp="1"/>
+          </p:cNvSpPr>
+          <p:nvPr>
+            <p:ph type="body" sz="half" idx="2"/>
+          </p:nvPr>
+        </p:nvSpPr>
+        <p:spPr/>
+        <p:txBody>
+          <a:bodyPr/>
+          <a:lstStyle/>
+          <a:p>
+            <a:r>
+              <a:rPr lang="en-US" dirty="0" smtClean="0">
+                <a:solidFill>
+                  <a:schemeClr val="tx2">
+                    <a:lumMod val="40000"/>
+                    <a:lumOff val="60000"/>
+                  </a:schemeClr>
+                </a:solidFill>
+              </a:rPr>
+              <a:t>4 working units (video potential?)</a:t>
+            </a:r>
+            <a:endParaRPr lang="en-US" dirty="0">
+              <a:solidFill>
+                <a:schemeClr val="tx2">
+                  <a:lumMod val="40000"/>
+                  <a:lumOff val="60000"/>
+                </a:schemeClr>
+              </a:solidFill>
+            </a:endParaRPr>
+          </a:p>
+        </p:txBody>
+      </p:sp>
+      <p:sp>
+        <p:nvSpPr>
+          <p:cNvPr id="5" name="WordArt 2"/>
+          <p:cNvSpPr>
+            <a:spLocks noChangeArrowheads="1" noChangeShapeType="1" noTextEdit="1"/>
+          </p:cNvSpPr>
+          <p:nvPr/>
+        </p:nvSpPr>
+        <p:spPr bwMode="auto">
+          <a:xfrm>
+            <a:off x="9706840" y="6317029"/>
+            <a:ext cx="2171700" cy="269875"/>
+          </a:xfrm>
+          <a:prstGeom prst="rect">
+            <a:avLst/>
+          </a:prstGeom>
+          <a:extLst>
+            <a:ext uri="{AF507438-7753-43E0-B8FC-AC1667EBCBE1}">
+              <a14:hiddenEffects xmlns:a14="http://schemas.microsoft.com/office/drawing/2010/main">
+                <a:effectLst/>
+              </a14:hiddenEffects>
+            </a:ext>
+          </a:extLst>
+        </p:spPr>
+        <p:txBody>
+          <a:bodyPr wrap="none" fromWordArt="1">
+            <a:prstTxWarp prst="textPlain">
+              <a:avLst>
+                <a:gd name="adj" fmla="val 50000"/>
+              </a:avLst>
+            </a:prstTxWarp>
+          </a:bodyPr>
+          <a:lstStyle/>
+          <a:p>
+            <a:pPr algn="ctr" rtl="0">
+              <a:buNone/>
+            </a:pPr>
+            <a:r>
+              <a:rPr lang="en-US" sz="3600" kern="10" spc="0" smtClean="0">
+                <a:ln w="9525">
+                  <a:solidFill>
+                    <a:srgbClr val="000000"/>
+                  </a:solidFill>
+                  <a:round/>
+                  <a:headEnd/>
+                  <a:tailEnd/>
+                </a:ln>
+                <a:solidFill>
+                  <a:srgbClr val="FFFFFF"/>
+                </a:solidFill>
+                <a:effectLst/>
+                <a:latin typeface="Arial Black" panose="020B0A04020102020204" pitchFamily="34" charset="0"/>
+              </a:rPr>
+              <a:t>SignalSenders</a:t>
+            </a:r>
+            <a:endParaRPr lang="en-US" sz="3600" kern="10" spc="0">
+              <a:ln w="9525">
+                <a:solidFill>
+                  <a:srgbClr val="000000"/>
+                </a:solidFill>
+                <a:round/>
+                <a:headEnd/>
+                <a:tailEnd/>
+              </a:ln>
+              <a:solidFill>
+                <a:srgbClr val="FFFFFF"/>
+              </a:solidFill>
+              <a:effectLst/>
+              <a:latin typeface="Arial Black" panose="020B0A04020102020204" pitchFamily="34" charset="0"/>
+            </a:endParaRPr>
+          </a:p>
+        </p:txBody>
+      </p:sp>
+    </p:spTree>
+    <p:extLst>
+      <p:ext uri="{BB962C8B-B14F-4D97-AF65-F5344CB8AC3E}">
+        <p14:creationId xmlns:p14="http://schemas.microsoft.com/office/powerpoint/2010/main" val="1772790167"/>
+      </p:ext>
+    </p:extLst>
+  </p:cSld>
+  <p:clrMapOvr>
+    <a:masterClrMapping/>
+  </p:clrMapOvr>
+  <p:timing>
+    <p:tnLst>
+      <p:par>
+        <p:cTn id="1" dur="indefinite" restart="never" nodeType="tmRoot"/>
+      </p:par>
+    </p:tnLst>
+  </p:timing>
+</p:sld>
+</file>
+
+<file path=ppt/slides/slide19.xml><?xml version="1.0" encoding="utf-8"?>
+<p:sld xmlns:a="http://schemas.openxmlformats.org/drawingml/2006/main" xmlns:r="http://schemas.openxmlformats.org/officeDocument/2006/relationships" xmlns:p="http://schemas.openxmlformats.org/presentationml/2006/main">
+  <p:cSld>
+    <p:spTree>
+      <p:nvGrpSpPr>
+        <p:cNvPr id="1" name=""/>
+        <p:cNvGrpSpPr/>
+        <p:nvPr/>
+      </p:nvGrpSpPr>
+      <p:grpSpPr>
+        <a:xfrm>
+          <a:off x="0" y="0"/>
+          <a:ext cx="0" cy="0"/>
+          <a:chOff x="0" y="0"/>
+          <a:chExt cx="0" cy="0"/>
+        </a:xfrm>
+      </p:grpSpPr>
+      <p:sp>
+        <p:nvSpPr>
+          <p:cNvPr id="2" name="Title 1"/>
+          <p:cNvSpPr>
+            <a:spLocks noGrp="1"/>
+          </p:cNvSpPr>
+          <p:nvPr>
+            <p:ph type="title"/>
+          </p:nvPr>
+        </p:nvSpPr>
+        <p:spPr/>
+        <p:txBody>
+          <a:bodyPr/>
+          <a:lstStyle/>
+          <a:p>
+            <a:r>
+              <a:rPr lang="en-US" dirty="0" smtClean="0">
+                <a:solidFill>
+                  <a:schemeClr val="bg2"/>
+                </a:solidFill>
+              </a:rPr>
+              <a:t>Contributions</a:t>
+            </a:r>
+            <a:endParaRPr lang="en-US" dirty="0">
+              <a:solidFill>
+                <a:schemeClr val="bg2"/>
+              </a:solidFill>
+            </a:endParaRPr>
+          </a:p>
+        </p:txBody>
+      </p:sp>
+      <p:sp>
+        <p:nvSpPr>
+          <p:cNvPr id="3" name="Text Placeholder 2"/>
+          <p:cNvSpPr>
+            <a:spLocks noGrp="1"/>
+          </p:cNvSpPr>
+          <p:nvPr>
+            <p:ph type="body" idx="1"/>
+          </p:nvPr>
+        </p:nvSpPr>
+        <p:spPr/>
+        <p:txBody>
+          <a:bodyPr/>
+          <a:lstStyle/>
+          <a:p>
+            <a:r>
+              <a:rPr lang="en-US" sz="2800" dirty="0" smtClean="0">
+                <a:solidFill>
+                  <a:schemeClr val="tx2">
+                    <a:lumMod val="40000"/>
+                    <a:lumOff val="60000"/>
+                  </a:schemeClr>
+                </a:solidFill>
+              </a:rPr>
+              <a:t>Max cope</a:t>
+            </a:r>
+            <a:endParaRPr lang="en-US" sz="2800" dirty="0">
+              <a:solidFill>
+                <a:schemeClr val="tx2">
+                  <a:lumMod val="40000"/>
+                  <a:lumOff val="60000"/>
+                </a:schemeClr>
+              </a:solidFill>
+            </a:endParaRPr>
+          </a:p>
+        </p:txBody>
+      </p:sp>
+      <p:sp>
+        <p:nvSpPr>
+          <p:cNvPr id="4" name="Text Placeholder 3"/>
+          <p:cNvSpPr>
+            <a:spLocks noGrp="1"/>
+          </p:cNvSpPr>
+          <p:nvPr>
+            <p:ph type="body" sz="half" idx="15"/>
+          </p:nvPr>
+        </p:nvSpPr>
+        <p:spPr/>
+        <p:txBody>
+          <a:bodyPr>
+            <a:normAutofit/>
+          </a:bodyPr>
+          <a:lstStyle/>
+          <a:p>
+            <a:pPr marL="285750" indent="-285750">
+              <a:buFont typeface="Arial" panose="020B0604020202020204" pitchFamily="34" charset="0"/>
+              <a:buChar char="•"/>
+            </a:pPr>
+            <a:r>
+              <a:rPr lang="en-US" sz="2000" dirty="0" smtClean="0">
+                <a:solidFill>
+                  <a:schemeClr val="tx2">
+                    <a:lumMod val="40000"/>
+                    <a:lumOff val="60000"/>
+                  </a:schemeClr>
+                </a:solidFill>
+              </a:rPr>
+              <a:t>RF signals</a:t>
+            </a:r>
+          </a:p>
+          <a:p>
+            <a:pPr marL="285750" indent="-285750">
+              <a:buFont typeface="Arial" panose="020B0604020202020204" pitchFamily="34" charset="0"/>
+              <a:buChar char="•"/>
+            </a:pPr>
+            <a:r>
+              <a:rPr lang="en-US" sz="2000" dirty="0" smtClean="0">
+                <a:solidFill>
+                  <a:schemeClr val="tx2">
+                    <a:lumMod val="40000"/>
+                    <a:lumOff val="60000"/>
+                  </a:schemeClr>
+                </a:solidFill>
+              </a:rPr>
+              <a:t>RF Firmware</a:t>
+            </a:r>
+            <a:endParaRPr lang="en-US" sz="2000" dirty="0">
+              <a:solidFill>
+                <a:schemeClr val="tx2">
+                  <a:lumMod val="40000"/>
+                  <a:lumOff val="60000"/>
+                </a:schemeClr>
+              </a:solidFill>
+            </a:endParaRPr>
+          </a:p>
+        </p:txBody>
+      </p:sp>
+      <p:sp>
+        <p:nvSpPr>
+          <p:cNvPr id="5" name="Text Placeholder 4"/>
+          <p:cNvSpPr>
+            <a:spLocks noGrp="1"/>
+          </p:cNvSpPr>
+          <p:nvPr>
+            <p:ph type="body" sz="quarter" idx="3"/>
+          </p:nvPr>
+        </p:nvSpPr>
+        <p:spPr/>
+        <p:txBody>
+          <a:bodyPr/>
+          <a:lstStyle/>
+          <a:p>
+            <a:r>
+              <a:rPr lang="en-US" sz="2800" dirty="0" smtClean="0">
+                <a:solidFill>
+                  <a:schemeClr val="tx2">
+                    <a:lumMod val="40000"/>
+                    <a:lumOff val="60000"/>
+                  </a:schemeClr>
+                </a:solidFill>
+              </a:rPr>
+              <a:t>Leslie Eide</a:t>
+            </a:r>
+            <a:endParaRPr lang="en-US" sz="2800" dirty="0">
+              <a:solidFill>
+                <a:schemeClr val="tx2">
+                  <a:lumMod val="40000"/>
+                  <a:lumOff val="60000"/>
+                </a:schemeClr>
+              </a:solidFill>
+            </a:endParaRPr>
+          </a:p>
+        </p:txBody>
+      </p:sp>
+      <p:sp>
+        <p:nvSpPr>
+          <p:cNvPr id="6" name="Text Placeholder 5"/>
+          <p:cNvSpPr>
+            <a:spLocks noGrp="1"/>
+          </p:cNvSpPr>
+          <p:nvPr>
+            <p:ph type="body" sz="half" idx="16"/>
+          </p:nvPr>
+        </p:nvSpPr>
+        <p:spPr/>
+        <p:txBody>
+          <a:bodyPr>
+            <a:normAutofit/>
+          </a:bodyPr>
+          <a:lstStyle/>
+          <a:p>
+            <a:pPr marL="285750" indent="-285750">
+              <a:buFont typeface="Arial" panose="020B0604020202020204" pitchFamily="34" charset="0"/>
+              <a:buChar char="•"/>
+            </a:pPr>
+            <a:r>
+              <a:rPr lang="en-US" sz="2000" dirty="0" smtClean="0">
+                <a:solidFill>
+                  <a:schemeClr val="tx2">
+                    <a:lumMod val="40000"/>
+                    <a:lumOff val="60000"/>
+                  </a:schemeClr>
+                </a:solidFill>
+              </a:rPr>
+              <a:t>IR motion detector</a:t>
+            </a:r>
+          </a:p>
+          <a:p>
+            <a:pPr marL="285750" indent="-285750">
+              <a:buFont typeface="Arial" panose="020B0604020202020204" pitchFamily="34" charset="0"/>
+              <a:buChar char="•"/>
+            </a:pPr>
+            <a:r>
+              <a:rPr lang="en-US" sz="2000" dirty="0" smtClean="0">
+                <a:solidFill>
+                  <a:schemeClr val="tx2">
+                    <a:lumMod val="40000"/>
+                    <a:lumOff val="60000"/>
+                  </a:schemeClr>
+                </a:solidFill>
+              </a:rPr>
+              <a:t>LED output panel</a:t>
+            </a:r>
+            <a:endParaRPr lang="en-US" sz="2000" dirty="0">
+              <a:solidFill>
+                <a:schemeClr val="tx2">
+                  <a:lumMod val="40000"/>
+                  <a:lumOff val="60000"/>
+                </a:schemeClr>
+              </a:solidFill>
+            </a:endParaRPr>
+          </a:p>
+        </p:txBody>
+      </p:sp>
+      <p:sp>
+        <p:nvSpPr>
+          <p:cNvPr id="7" name="Text Placeholder 6"/>
+          <p:cNvSpPr>
+            <a:spLocks noGrp="1"/>
+          </p:cNvSpPr>
+          <p:nvPr>
+            <p:ph type="body" sz="quarter" idx="13"/>
+          </p:nvPr>
+        </p:nvSpPr>
+        <p:spPr>
+          <a:xfrm>
+            <a:off x="7852441" y="2674463"/>
+            <a:ext cx="3935005" cy="685800"/>
+          </a:xfrm>
+        </p:spPr>
+        <p:txBody>
+          <a:bodyPr/>
+          <a:lstStyle/>
+          <a:p>
+            <a:r>
+              <a:rPr lang="en-US" sz="2800" dirty="0" smtClean="0">
+                <a:solidFill>
+                  <a:schemeClr val="tx2">
+                    <a:lumMod val="40000"/>
+                    <a:lumOff val="60000"/>
+                  </a:schemeClr>
+                </a:solidFill>
+              </a:rPr>
+              <a:t>Chris Klupenger</a:t>
+            </a:r>
+            <a:endParaRPr lang="en-US" sz="2800" dirty="0">
+              <a:solidFill>
+                <a:schemeClr val="tx2">
+                  <a:lumMod val="40000"/>
+                  <a:lumOff val="60000"/>
+                </a:schemeClr>
+              </a:solidFill>
+            </a:endParaRPr>
+          </a:p>
+        </p:txBody>
+      </p:sp>
+      <p:sp>
+        <p:nvSpPr>
+          <p:cNvPr id="8" name="Text Placeholder 7"/>
+          <p:cNvSpPr>
+            <a:spLocks noGrp="1"/>
+          </p:cNvSpPr>
+          <p:nvPr>
+            <p:ph type="body" sz="half" idx="17"/>
+          </p:nvPr>
+        </p:nvSpPr>
+        <p:spPr/>
+        <p:txBody>
+          <a:bodyPr>
+            <a:normAutofit/>
+          </a:bodyPr>
+          <a:lstStyle/>
+          <a:p>
+            <a:pPr marL="285750" indent="-285750">
+              <a:buFont typeface="Arial" panose="020B0604020202020204" pitchFamily="34" charset="0"/>
+              <a:buChar char="•"/>
+            </a:pPr>
+            <a:r>
+              <a:rPr lang="en-US" sz="2000" dirty="0" smtClean="0">
+                <a:solidFill>
+                  <a:schemeClr val="tx2">
+                    <a:lumMod val="40000"/>
+                    <a:lumOff val="60000"/>
+                  </a:schemeClr>
+                </a:solidFill>
+              </a:rPr>
+              <a:t>Microcontroller</a:t>
+            </a:r>
+          </a:p>
+          <a:p>
+            <a:pPr marL="285750" indent="-285750">
+              <a:buFont typeface="Arial" panose="020B0604020202020204" pitchFamily="34" charset="0"/>
+              <a:buChar char="•"/>
+            </a:pPr>
+            <a:r>
+              <a:rPr lang="en-US" sz="2000" dirty="0" smtClean="0">
+                <a:solidFill>
+                  <a:schemeClr val="tx2">
+                    <a:lumMod val="40000"/>
+                    <a:lumOff val="60000"/>
+                  </a:schemeClr>
+                </a:solidFill>
+              </a:rPr>
+              <a:t>Programming</a:t>
+            </a:r>
+            <a:endParaRPr lang="en-US" sz="2000" dirty="0">
+              <a:solidFill>
+                <a:schemeClr val="tx2">
+                  <a:lumMod val="40000"/>
+                  <a:lumOff val="60000"/>
+                </a:schemeClr>
+              </a:solidFill>
+            </a:endParaRPr>
+          </a:p>
+        </p:txBody>
+      </p:sp>
+      <p:sp>
+        <p:nvSpPr>
+          <p:cNvPr id="9" name="WordArt 2"/>
+          <p:cNvSpPr>
+            <a:spLocks noChangeArrowheads="1" noChangeShapeType="1" noTextEdit="1"/>
+          </p:cNvSpPr>
+          <p:nvPr/>
+        </p:nvSpPr>
+        <p:spPr bwMode="auto">
+          <a:xfrm>
+            <a:off x="9706840" y="6317029"/>
+            <a:ext cx="2171700" cy="269875"/>
+          </a:xfrm>
+          <a:prstGeom prst="rect">
+            <a:avLst/>
+          </a:prstGeom>
+          <a:extLst>
+            <a:ext uri="{AF507438-7753-43E0-B8FC-AC1667EBCBE1}">
+              <a14:hiddenEffects xmlns:a14="http://schemas.microsoft.com/office/drawing/2010/main">
+                <a:effectLst/>
+              </a14:hiddenEffects>
+            </a:ext>
+          </a:extLst>
+        </p:spPr>
+        <p:txBody>
+          <a:bodyPr wrap="none" fromWordArt="1">
+            <a:prstTxWarp prst="textPlain">
+              <a:avLst>
+                <a:gd name="adj" fmla="val 50000"/>
+              </a:avLst>
+            </a:prstTxWarp>
+          </a:bodyPr>
+          <a:lstStyle/>
+          <a:p>
+            <a:pPr algn="ctr" rtl="0">
+              <a:buNone/>
+            </a:pPr>
+            <a:r>
+              <a:rPr lang="en-US" sz="3600" kern="10" spc="0" smtClean="0">
+                <a:ln w="9525">
+                  <a:solidFill>
+                    <a:srgbClr val="000000"/>
+                  </a:solidFill>
+                  <a:round/>
+                  <a:headEnd/>
+                  <a:tailEnd/>
+                </a:ln>
+                <a:solidFill>
+                  <a:srgbClr val="FFFFFF"/>
+                </a:solidFill>
+                <a:effectLst/>
+                <a:latin typeface="Arial Black" panose="020B0A04020102020204" pitchFamily="34" charset="0"/>
+              </a:rPr>
+              <a:t>SignalSenders</a:t>
+            </a:r>
+            <a:endParaRPr lang="en-US" sz="3600" kern="10" spc="0">
+              <a:ln w="9525">
+                <a:solidFill>
+                  <a:srgbClr val="000000"/>
+                </a:solidFill>
+                <a:round/>
+                <a:headEnd/>
+                <a:tailEnd/>
+              </a:ln>
+              <a:solidFill>
+                <a:srgbClr val="FFFFFF"/>
+              </a:solidFill>
+              <a:effectLst/>
+              <a:latin typeface="Arial Black" panose="020B0A04020102020204" pitchFamily="34" charset="0"/>
+            </a:endParaRPr>
+          </a:p>
+        </p:txBody>
+      </p:sp>
+    </p:spTree>
+    <p:extLst>
+      <p:ext uri="{BB962C8B-B14F-4D97-AF65-F5344CB8AC3E}">
+        <p14:creationId xmlns:p14="http://schemas.microsoft.com/office/powerpoint/2010/main" val="854377500"/>
       </p:ext>
     </p:extLst>
   </p:cSld>
@@ -15580,43 +16050,7 @@
                   </a:outerShdw>
                 </a:effectLst>
               </a:rPr>
-              <a:t>Originated from Sprinklers Systems Designed </a:t>
-            </a:r>
-            <a:r>
-              <a:rPr lang="en-US" sz="2000" dirty="0" smtClean="0">
-                <a:solidFill>
-                  <a:schemeClr val="tx2">
-                    <a:lumMod val="40000"/>
-                    <a:lumOff val="60000"/>
-                  </a:schemeClr>
-                </a:solidFill>
-                <a:effectLst>
-                  <a:outerShdw blurRad="152400" dist="38100" dir="2700000" algn="tl">
-                    <a:srgbClr val="000000">
-                      <a:alpha val="36000"/>
-                    </a:srgbClr>
-                  </a:outerShdw>
-                </a:effectLst>
-              </a:rPr>
-              <a:t>to </a:t>
-            </a:r>
-            <a:r>
-              <a:rPr lang="en-US" sz="2000" dirty="0" smtClean="0">
-                <a:solidFill>
-                  <a:schemeClr val="tx2">
-                    <a:lumMod val="40000"/>
-                    <a:lumOff val="60000"/>
-                  </a:schemeClr>
-                </a:solidFill>
-                <a:effectLst>
-                  <a:outerShdw blurRad="152400" dist="38100" dir="2700000" algn="tl">
-                    <a:srgbClr val="000000">
-                      <a:alpha val="36000"/>
-                    </a:srgbClr>
-                  </a:outerShdw>
-                </a:effectLst>
-              </a:rPr>
-              <a:t>Keep Deer off Property</a:t>
+              <a:t>Originated from Sprinklers Systems Designed to Keep Deer off Property</a:t>
             </a:r>
           </a:p>
           <a:p>
@@ -15711,21 +16145,6 @@
               </a:rPr>
               <a:t>Timers </a:t>
             </a:r>
-            <a:endParaRPr lang="en-US" sz="2000" dirty="0" smtClean="0">
-              <a:solidFill>
-                <a:schemeClr val="tx2">
-                  <a:lumMod val="40000"/>
-                  <a:lumOff val="60000"/>
-                </a:schemeClr>
-              </a:solidFill>
-              <a:effectLst>
-                <a:outerShdw blurRad="152400" dist="38100" dir="2700000" algn="tl">
-                  <a:srgbClr val="000000">
-                    <a:alpha val="36000"/>
-                  </a:srgbClr>
-                </a:outerShdw>
-              </a:effectLst>
-            </a:endParaRPr>
           </a:p>
         </p:txBody>
       </p:sp>
@@ -15851,6 +16270,178 @@
 </p:sld>
 </file>
 
+<file path=ppt/slides/slide20.xml><?xml version="1.0" encoding="utf-8"?>
+<p:sld xmlns:a="http://schemas.openxmlformats.org/drawingml/2006/main" xmlns:r="http://schemas.openxmlformats.org/officeDocument/2006/relationships" xmlns:p="http://schemas.openxmlformats.org/presentationml/2006/main">
+  <p:cSld>
+    <p:spTree>
+      <p:nvGrpSpPr>
+        <p:cNvPr id="1" name=""/>
+        <p:cNvGrpSpPr/>
+        <p:nvPr/>
+      </p:nvGrpSpPr>
+      <p:grpSpPr>
+        <a:xfrm>
+          <a:off x="0" y="0"/>
+          <a:ext cx="0" cy="0"/>
+          <a:chOff x="0" y="0"/>
+          <a:chExt cx="0" cy="0"/>
+        </a:xfrm>
+      </p:grpSpPr>
+      <p:sp>
+        <p:nvSpPr>
+          <p:cNvPr id="2" name="Title 1"/>
+          <p:cNvSpPr>
+            <a:spLocks noGrp="1"/>
+          </p:cNvSpPr>
+          <p:nvPr>
+            <p:ph type="title"/>
+          </p:nvPr>
+        </p:nvSpPr>
+        <p:spPr>
+          <a:xfrm>
+            <a:off x="1555029" y="76200"/>
+            <a:ext cx="9056686" cy="2314575"/>
+          </a:xfrm>
+        </p:spPr>
+        <p:txBody>
+          <a:bodyPr/>
+          <a:lstStyle/>
+          <a:p>
+            <a:r>
+              <a:rPr lang="en-US" dirty="0" smtClean="0">
+                <a:solidFill>
+                  <a:schemeClr val="bg2"/>
+                </a:solidFill>
+              </a:rPr>
+              <a:t>Lessons Learned</a:t>
+            </a:r>
+            <a:endParaRPr lang="en-US" dirty="0">
+              <a:solidFill>
+                <a:schemeClr val="bg2"/>
+              </a:solidFill>
+            </a:endParaRPr>
+          </a:p>
+        </p:txBody>
+      </p:sp>
+      <p:sp>
+        <p:nvSpPr>
+          <p:cNvPr id="3" name="Text Placeholder 2"/>
+          <p:cNvSpPr>
+            <a:spLocks noGrp="1"/>
+          </p:cNvSpPr>
+          <p:nvPr>
+            <p:ph type="body" sz="half" idx="2"/>
+          </p:nvPr>
+        </p:nvSpPr>
+        <p:spPr/>
+        <p:txBody>
+          <a:bodyPr/>
+          <a:lstStyle/>
+          <a:p>
+            <a:endParaRPr lang="en-US" dirty="0">
+              <a:solidFill>
+                <a:schemeClr val="tx2">
+                  <a:lumMod val="40000"/>
+                  <a:lumOff val="60000"/>
+                </a:schemeClr>
+              </a:solidFill>
+            </a:endParaRPr>
+          </a:p>
+        </p:txBody>
+      </p:sp>
+      <p:sp>
+        <p:nvSpPr>
+          <p:cNvPr id="4" name="WordArt 2"/>
+          <p:cNvSpPr>
+            <a:spLocks noChangeArrowheads="1" noChangeShapeType="1" noTextEdit="1"/>
+          </p:cNvSpPr>
+          <p:nvPr/>
+        </p:nvSpPr>
+        <p:spPr bwMode="auto">
+          <a:xfrm>
+            <a:off x="9706840" y="6317029"/>
+            <a:ext cx="2171700" cy="269875"/>
+          </a:xfrm>
+          <a:prstGeom prst="rect">
+            <a:avLst/>
+          </a:prstGeom>
+          <a:extLst>
+            <a:ext uri="{AF507438-7753-43E0-B8FC-AC1667EBCBE1}">
+              <a14:hiddenEffects xmlns:a14="http://schemas.microsoft.com/office/drawing/2010/main">
+                <a:effectLst/>
+              </a14:hiddenEffects>
+            </a:ext>
+          </a:extLst>
+        </p:spPr>
+        <p:txBody>
+          <a:bodyPr wrap="none" fromWordArt="1">
+            <a:prstTxWarp prst="textPlain">
+              <a:avLst>
+                <a:gd name="adj" fmla="val 50000"/>
+              </a:avLst>
+            </a:prstTxWarp>
+          </a:bodyPr>
+          <a:lstStyle/>
+          <a:p>
+            <a:pPr algn="ctr" rtl="0">
+              <a:buNone/>
+            </a:pPr>
+            <a:r>
+              <a:rPr lang="en-US" sz="3600" kern="10" spc="0" smtClean="0">
+                <a:ln w="9525">
+                  <a:solidFill>
+                    <a:srgbClr val="000000"/>
+                  </a:solidFill>
+                  <a:round/>
+                  <a:headEnd/>
+                  <a:tailEnd/>
+                </a:ln>
+                <a:solidFill>
+                  <a:srgbClr val="FFFFFF"/>
+                </a:solidFill>
+                <a:effectLst/>
+                <a:latin typeface="Arial Black" panose="020B0A04020102020204" pitchFamily="34" charset="0"/>
+              </a:rPr>
+              <a:t>SignalSenders</a:t>
+            </a:r>
+            <a:endParaRPr lang="en-US" sz="3600" kern="10" spc="0">
+              <a:ln w="9525">
+                <a:solidFill>
+                  <a:srgbClr val="000000"/>
+                </a:solidFill>
+                <a:round/>
+                <a:headEnd/>
+                <a:tailEnd/>
+              </a:ln>
+              <a:solidFill>
+                <a:srgbClr val="FFFFFF"/>
+              </a:solidFill>
+              <a:effectLst/>
+              <a:latin typeface="Arial Black" panose="020B0A04020102020204" pitchFamily="34" charset="0"/>
+            </a:endParaRPr>
+          </a:p>
+        </p:txBody>
+      </p:sp>
+    </p:spTree>
+    <p:extLst>
+      <p:ext uri="{BB962C8B-B14F-4D97-AF65-F5344CB8AC3E}">
+        <p14:creationId xmlns:p14="http://schemas.microsoft.com/office/powerpoint/2010/main" val="1572304002"/>
+      </p:ext>
+    </p:extLst>
+  </p:cSld>
+  <p:clrMapOvr>
+    <a:masterClrMapping/>
+  </p:clrMapOvr>
+  <p:timing>
+    <p:tnLst>
+      <p:par>
+        <p:cTn id="1" dur="indefinite" restart="never" nodeType="tmRoot"/>
+      </p:par>
+    </p:tnLst>
+  </p:timing>
+</p:sld>
+</file>
+
 <file path=ppt/slides/slide3.xml><?xml version="1.0" encoding="utf-8"?>
 <p:sld xmlns:a="http://schemas.openxmlformats.org/drawingml/2006/main" xmlns:r="http://schemas.openxmlformats.org/officeDocument/2006/relationships" xmlns:p="http://schemas.openxmlformats.org/presentationml/2006/main">
   <p:cSld>
@@ -15933,8 +16524,10 @@
                   </a:schemeClr>
                 </a:solidFill>
               </a:rPr>
-              <a:t>Develop </a:t>
-            </a:r>
+              <a:t>Develop a Security Network with Communication Capabilities</a:t>
+            </a:r>
+          </a:p>
+          <a:p>
             <a:r>
               <a:rPr lang="en-US" dirty="0" smtClean="0">
                 <a:solidFill>
@@ -15944,20 +16537,13 @@
                   </a:schemeClr>
                 </a:solidFill>
               </a:rPr>
-              <a:t>a Security Network with Communication Capabilities</a:t>
-            </a:r>
-            <a:endParaRPr lang="en-US" dirty="0" smtClean="0">
-              <a:solidFill>
-                <a:schemeClr val="tx2">
-                  <a:lumMod val="40000"/>
-                  <a:lumOff val="60000"/>
-                </a:schemeClr>
-              </a:solidFill>
-            </a:endParaRPr>
-          </a:p>
-          <a:p>
-            <a:r>
-              <a:rPr lang="en-US" dirty="0" smtClean="0">
+              <a:t>Utilize Communication within the 2.4GHz ISM band to lessen complexity </a:t>
+            </a:r>
+          </a:p>
+          <a:p>
+            <a:pPr marL="285750" lvl="0" indent="-285750"/>
+            <a:r>
+              <a:rPr lang="en-US" dirty="0">
                 <a:solidFill>
                   <a:schemeClr val="tx2">
                     <a:lumMod val="40000"/>
@@ -15965,52 +16551,8 @@
                   </a:schemeClr>
                 </a:solidFill>
               </a:rPr>
-              <a:t>Utilize </a:t>
-            </a:r>
-            <a:r>
-              <a:rPr lang="en-US" dirty="0" smtClean="0">
-                <a:solidFill>
-                  <a:schemeClr val="tx2">
-                    <a:lumMod val="40000"/>
-                    <a:lumOff val="60000"/>
-                  </a:schemeClr>
-                </a:solidFill>
-              </a:rPr>
-              <a:t>Communication </a:t>
-            </a:r>
-            <a:r>
-              <a:rPr lang="en-US" dirty="0" smtClean="0">
-                <a:solidFill>
-                  <a:schemeClr val="tx2">
-                    <a:lumMod val="40000"/>
-                    <a:lumOff val="60000"/>
-                  </a:schemeClr>
-                </a:solidFill>
-              </a:rPr>
-              <a:t>within the 2.4GHz ISM band to lessen complexity </a:t>
-            </a:r>
-          </a:p>
-          <a:p>
-            <a:pPr marL="285750" lvl="0" indent="-285750"/>
-            <a:r>
-              <a:rPr lang="en-US" dirty="0">
-                <a:solidFill>
-                  <a:schemeClr val="tx2">
-                    <a:lumMod val="40000"/>
-                    <a:lumOff val="60000"/>
-                  </a:schemeClr>
-                </a:solidFill>
-              </a:rPr>
               <a:t>Battery Operated to Eliminate Hard Wired Constrictions</a:t>
             </a:r>
-            <a:endParaRPr lang="en-US" dirty="0">
-              <a:solidFill>
-                <a:schemeClr val="tx2">
-                  <a:lumMod val="40000"/>
-                  <a:lumOff val="60000"/>
-                </a:schemeClr>
-              </a:solidFill>
-            </a:endParaRPr>
           </a:p>
         </p:txBody>
       </p:sp>
@@ -17218,7 +17760,7 @@
           <a:graphicData uri="http://schemas.openxmlformats.org/presentationml/2006/ole">
             <mc:AlternateContent xmlns:mc="http://schemas.openxmlformats.org/markup-compatibility/2006">
               <mc:Choice xmlns:v="urn:schemas-microsoft-com:vml" Requires="v">
-                <p:oleObj spid="_x0000_s13356" r:id="rId3" imgW="5067465" imgH="5813949" progId="Visio.Drawing.15">
+                <p:oleObj spid="_x0000_s13368" r:id="rId3" imgW="5067465" imgH="5813949" progId="Visio.Drawing.15">
                   <p:embed/>
                 </p:oleObj>
               </mc:Choice>
@@ -17617,7 +18159,7 @@
           <a:graphicData uri="http://schemas.openxmlformats.org/presentationml/2006/ole">
             <mc:AlternateContent xmlns:mc="http://schemas.openxmlformats.org/markup-compatibility/2006">
               <mc:Choice xmlns:v="urn:schemas-microsoft-com:vml" Requires="v">
-                <p:oleObj spid="_x0000_s14368" name="Visio" r:id="rId3" imgW="7307545" imgH="6804557" progId="Visio.Drawing.15">
+                <p:oleObj spid="_x0000_s14380" name="Visio" r:id="rId3" imgW="7307545" imgH="6804557" progId="Visio.Drawing.15">
                   <p:embed/>
                 </p:oleObj>
               </mc:Choice>
@@ -17749,14 +18291,6 @@
               </a:rPr>
               <a:t>Motion Detector</a:t>
             </a:r>
-            <a:endParaRPr lang="en-US" sz="3200" dirty="0" smtClean="0">
-              <a:solidFill>
-                <a:schemeClr val="tx2">
-                  <a:lumMod val="40000"/>
-                  <a:lumOff val="60000"/>
-                </a:schemeClr>
-              </a:solidFill>
-            </a:endParaRPr>
           </a:p>
           <a:p>
             <a:pPr lvl="1"/>
@@ -17771,14 +18305,6 @@
               </a:rPr>
               <a:t>Microcontroller</a:t>
             </a:r>
-            <a:endParaRPr lang="en-US" sz="3200" dirty="0" smtClean="0">
-              <a:solidFill>
-                <a:schemeClr val="tx2">
-                  <a:lumMod val="40000"/>
-                  <a:lumOff val="60000"/>
-                </a:schemeClr>
-              </a:solidFill>
-            </a:endParaRPr>
           </a:p>
           <a:p>
             <a:pPr lvl="1"/>
@@ -17815,14 +18341,6 @@
               </a:rPr>
               <a:t>LED Indicators</a:t>
             </a:r>
-            <a:endParaRPr lang="en-US" sz="3200" dirty="0" smtClean="0">
-              <a:solidFill>
-                <a:schemeClr val="tx2">
-                  <a:lumMod val="40000"/>
-                  <a:lumOff val="60000"/>
-                </a:schemeClr>
-              </a:solidFill>
-            </a:endParaRPr>
           </a:p>
           <a:p>
             <a:pPr lvl="1"/>
@@ -17837,14 +18355,6 @@
               </a:rPr>
               <a:t>Battery Power</a:t>
             </a:r>
-            <a:endParaRPr lang="en-US" sz="3200" dirty="0" smtClean="0">
-              <a:solidFill>
-                <a:schemeClr val="tx2">
-                  <a:lumMod val="40000"/>
-                  <a:lumOff val="60000"/>
-                </a:schemeClr>
-              </a:solidFill>
-            </a:endParaRPr>
           </a:p>
           <a:p>
             <a:pPr lvl="1"/>
@@ -18509,6 +19019,39 @@
               </a:rPr>
               <a:t>Tasks</a:t>
             </a:r>
+          </a:p>
+          <a:p>
+            <a:pPr marL="285750" indent="-285750">
+              <a:buFont typeface="Arial" panose="020B0604020202020204" pitchFamily="34" charset="0"/>
+              <a:buChar char="•"/>
+            </a:pPr>
+            <a:r>
+              <a:rPr lang="en-US" sz="2400" dirty="0" smtClean="0">
+                <a:solidFill>
+                  <a:schemeClr val="tx2">
+                    <a:lumMod val="40000"/>
+                    <a:lumOff val="60000"/>
+                  </a:schemeClr>
+                </a:solidFill>
+                <a:effectLst/>
+              </a:rPr>
+              <a:t>2.4 GHz ISM Band</a:t>
+            </a:r>
+          </a:p>
+          <a:p>
+            <a:pPr lvl="1"/>
+            <a:r>
+              <a:rPr lang="en-US" sz="2400" dirty="0">
+                <a:solidFill>
+                  <a:schemeClr val="tx2">
+                    <a:lumMod val="40000"/>
+                    <a:lumOff val="60000"/>
+                  </a:schemeClr>
+                </a:solidFill>
+                <a:effectLst/>
+              </a:rPr>
+              <a:t>Worldwide license-free</a:t>
+            </a:r>
             <a:endParaRPr lang="en-US" sz="2400" dirty="0" smtClean="0">
               <a:solidFill>
                 <a:schemeClr val="tx2">
@@ -18534,10 +19077,16 @@
                 </a:solidFill>
                 <a:effectLst/>
               </a:rPr>
-              <a:t>2.4 </a:t>
-            </a:r>
-            <a:r>
-              <a:rPr lang="en-US" sz="2400" dirty="0" smtClean="0">
+              <a:t>Communication Pipes</a:t>
+            </a:r>
+          </a:p>
+          <a:p>
+            <a:pPr marL="742950" lvl="1" indent="-285750">
+              <a:buFont typeface="Arial" panose="020B0604020202020204" pitchFamily="34" charset="0"/>
+              <a:buChar char="•"/>
+            </a:pPr>
+            <a:r>
+              <a:rPr lang="en-US" sz="2200" dirty="0" smtClean="0">
                 <a:solidFill>
                   <a:schemeClr val="tx2">
                     <a:lumMod val="40000"/>
@@ -18546,79 +19095,7 @@
                 </a:solidFill>
                 <a:effectLst/>
               </a:rPr>
-              <a:t>GHz ISM Band</a:t>
-            </a:r>
-          </a:p>
-          <a:p>
-            <a:pPr lvl="1"/>
-            <a:r>
-              <a:rPr lang="en-US" sz="2400" dirty="0">
-                <a:solidFill>
-                  <a:schemeClr val="tx2">
-                    <a:lumMod val="40000"/>
-                    <a:lumOff val="60000"/>
-                  </a:schemeClr>
-                </a:solidFill>
-                <a:effectLst/>
-              </a:rPr>
-              <a:t>Worldwide license-free</a:t>
-            </a:r>
-            <a:endParaRPr lang="en-US" sz="2400" dirty="0" smtClean="0">
-              <a:solidFill>
-                <a:schemeClr val="tx2">
-                  <a:lumMod val="40000"/>
-                  <a:lumOff val="60000"/>
-                </a:schemeClr>
-              </a:solidFill>
-              <a:effectLst/>
-            </a:endParaRPr>
-          </a:p>
-          <a:p>
-            <a:pPr marL="285750" indent="-285750">
-              <a:buFont typeface="Arial" panose="020B0604020202020204" pitchFamily="34" charset="0"/>
-              <a:buChar char="•"/>
-            </a:pPr>
-            <a:r>
-              <a:rPr lang="en-US" sz="2400" dirty="0" smtClean="0">
-                <a:solidFill>
-                  <a:schemeClr val="tx2">
-                    <a:lumMod val="40000"/>
-                    <a:lumOff val="60000"/>
-                  </a:schemeClr>
-                </a:solidFill>
-                <a:effectLst/>
-              </a:rPr>
-              <a:t>Communication Pipes</a:t>
-            </a:r>
-          </a:p>
-          <a:p>
-            <a:pPr marL="742950" lvl="1" indent="-285750">
-              <a:buFont typeface="Arial" panose="020B0604020202020204" pitchFamily="34" charset="0"/>
-              <a:buChar char="•"/>
-            </a:pPr>
-            <a:r>
-              <a:rPr lang="en-US" sz="2200" dirty="0" smtClean="0">
-                <a:solidFill>
-                  <a:schemeClr val="tx2">
-                    <a:lumMod val="40000"/>
-                    <a:lumOff val="60000"/>
-                  </a:schemeClr>
-                </a:solidFill>
-                <a:effectLst/>
-              </a:rPr>
-              <a:t>A Unique Pipe for </a:t>
-            </a:r>
-            <a:r>
-              <a:rPr lang="en-US" sz="2200" dirty="0" smtClean="0">
-                <a:solidFill>
-                  <a:schemeClr val="tx2">
-                    <a:lumMod val="40000"/>
-                    <a:lumOff val="60000"/>
-                  </a:schemeClr>
-                </a:solidFill>
-                <a:effectLst/>
-              </a:rPr>
-              <a:t>Each Units Communication</a:t>
+              <a:t>A Unique Pipe for Each Units Communication</a:t>
             </a:r>
           </a:p>
           <a:p>
@@ -19473,7 +19950,7 @@
   <a:extraClrSchemeLst/>
   <a:extLst>
     <a:ext uri="{05A4C25C-085E-4340-85A3-A5531E510DB2}">
-      <thm15:themeFamily xmlns:thm15="http://schemas.microsoft.com/office/thememl/2012/main" xmlns="" name="Circuit" id="{0AC2F7E7-15F5-431C-B2A2-456FE929F56C}" vid="{97ECCC31-8429-4523-BE8D-8F09B7A4D46D}"/>
+      <thm15:themeFamily xmlns="" xmlns:thm15="http://schemas.microsoft.com/office/thememl/2012/main" name="Circuit" id="{0AC2F7E7-15F5-431C-B2A2-456FE929F56C}" vid="{97ECCC31-8429-4523-BE8D-8F09B7A4D46D}"/>
     </a:ext>
   </a:extLst>
 </a:theme>

</xml_diff>